<commit_message>
Update Presentation - With Diagram.pptx
</commit_message>
<xml_diff>
--- a/Capstone Final/Presentation - With Diagram.pptx
+++ b/Capstone Final/Presentation - With Diagram.pptx
@@ -10,21 +10,21 @@
   <p:sldIdLst>
     <p:sldId id="256" r:id="rId2"/>
     <p:sldId id="260" r:id="rId3"/>
-    <p:sldId id="278" r:id="rId4"/>
-    <p:sldId id="295" r:id="rId5"/>
-    <p:sldId id="296" r:id="rId6"/>
-    <p:sldId id="297" r:id="rId7"/>
-    <p:sldId id="298" r:id="rId8"/>
-    <p:sldId id="299" r:id="rId9"/>
-    <p:sldId id="313" r:id="rId10"/>
-    <p:sldId id="300" r:id="rId11"/>
-    <p:sldId id="302" r:id="rId12"/>
-    <p:sldId id="303" r:id="rId13"/>
-    <p:sldId id="304" r:id="rId14"/>
-    <p:sldId id="305" r:id="rId15"/>
-    <p:sldId id="306" r:id="rId16"/>
-    <p:sldId id="307" r:id="rId17"/>
-    <p:sldId id="308" r:id="rId18"/>
+    <p:sldId id="295" r:id="rId4"/>
+    <p:sldId id="296" r:id="rId5"/>
+    <p:sldId id="297" r:id="rId6"/>
+    <p:sldId id="298" r:id="rId7"/>
+    <p:sldId id="299" r:id="rId8"/>
+    <p:sldId id="313" r:id="rId9"/>
+    <p:sldId id="300" r:id="rId10"/>
+    <p:sldId id="302" r:id="rId11"/>
+    <p:sldId id="303" r:id="rId12"/>
+    <p:sldId id="304" r:id="rId13"/>
+    <p:sldId id="305" r:id="rId14"/>
+    <p:sldId id="306" r:id="rId15"/>
+    <p:sldId id="307" r:id="rId16"/>
+    <p:sldId id="308" r:id="rId17"/>
+    <p:sldId id="333" r:id="rId18"/>
     <p:sldId id="309" r:id="rId19"/>
     <p:sldId id="310" r:id="rId20"/>
     <p:sldId id="311" r:id="rId21"/>
@@ -53,22 +53,22 @@
   <p:notesSz cx="6858000" cy="9144000"/>
   <p:embeddedFontLst>
     <p:embeddedFont>
-      <p:font typeface="Walter Turncoat" panose="02000000000000000000" pitchFamily="2" charset="0"/>
+      <p:font typeface="Nunito" panose="020B0604020202020204" charset="0"/>
       <p:regular r:id="rId43"/>
-    </p:embeddedFont>
-    <p:embeddedFont>
-      <p:font typeface="Nunito" panose="020B0604020202020204" charset="0"/>
-      <p:regular r:id="rId44"/>
-      <p:bold r:id="rId45"/>
-      <p:italic r:id="rId46"/>
-      <p:boldItalic r:id="rId47"/>
+      <p:bold r:id="rId44"/>
+      <p:italic r:id="rId45"/>
+      <p:boldItalic r:id="rId46"/>
     </p:embeddedFont>
     <p:embeddedFont>
       <p:font typeface="Calibri" panose="020F0502020204030204" pitchFamily="34" charset="0"/>
-      <p:regular r:id="rId48"/>
-      <p:bold r:id="rId49"/>
-      <p:italic r:id="rId50"/>
-      <p:boldItalic r:id="rId51"/>
+      <p:regular r:id="rId47"/>
+      <p:bold r:id="rId48"/>
+      <p:italic r:id="rId49"/>
+      <p:boldItalic r:id="rId50"/>
+    </p:embeddedFont>
+    <p:embeddedFont>
+      <p:font typeface="Walter Turncoat" panose="02000000000000000000" pitchFamily="2" charset="0"/>
+      <p:regular r:id="rId51"/>
     </p:embeddedFont>
   </p:embeddedFontLst>
   <p:defaultTextStyle>
@@ -962,7 +962,7 @@
     </p:spTree>
     <p:extLst>
       <p:ext uri="{BB962C8B-B14F-4D97-AF65-F5344CB8AC3E}">
-        <p14:creationId xmlns:p14="http://schemas.microsoft.com/office/powerpoint/2010/main" val="3223294300"/>
+        <p14:creationId xmlns:p14="http://schemas.microsoft.com/office/powerpoint/2010/main" val="3122360990"/>
       </p:ext>
     </p:extLst>
   </p:cSld>
@@ -973,6 +973,551 @@
 </file>
 
 <file path=ppt/notesSlides/notesSlide11.xml><?xml version="1.0" encoding="utf-8"?>
+<p:notes xmlns:a="http://schemas.openxmlformats.org/drawingml/2006/main" xmlns:r="http://schemas.openxmlformats.org/officeDocument/2006/relationships" xmlns:p="http://schemas.openxmlformats.org/presentationml/2006/main" showMasterSp="0" showMasterPhAnim="0">
+  <p:cSld>
+    <p:spTree>
+      <p:nvGrpSpPr>
+        <p:cNvPr id="1" name="Shape 269"/>
+        <p:cNvGrpSpPr/>
+        <p:nvPr/>
+      </p:nvGrpSpPr>
+      <p:grpSpPr>
+        <a:xfrm>
+          <a:off x="0" y="0"/>
+          <a:ext cx="0" cy="0"/>
+          <a:chOff x="0" y="0"/>
+          <a:chExt cx="0" cy="0"/>
+        </a:xfrm>
+      </p:grpSpPr>
+      <p:sp>
+        <p:nvSpPr>
+          <p:cNvPr id="270" name="Google Shape;270;g35f391192_017:notes"/>
+          <p:cNvSpPr>
+            <a:spLocks noGrp="1" noRot="1" noChangeAspect="1"/>
+          </p:cNvSpPr>
+          <p:nvPr>
+            <p:ph type="sldImg" idx="2"/>
+          </p:nvPr>
+        </p:nvSpPr>
+        <p:spPr>
+          <a:xfrm>
+            <a:off x="381000" y="685800"/>
+            <a:ext cx="6096000" cy="3429000"/>
+          </a:xfrm>
+          <a:custGeom>
+            <a:avLst/>
+            <a:gdLst/>
+            <a:ahLst/>
+            <a:cxnLst/>
+            <a:rect l="l" t="t" r="r" b="b"/>
+            <a:pathLst>
+              <a:path w="120000" h="120000" extrusionOk="0">
+                <a:moveTo>
+                  <a:pt x="0" y="0"/>
+                </a:moveTo>
+                <a:lnTo>
+                  <a:pt x="120000" y="0"/>
+                </a:lnTo>
+                <a:lnTo>
+                  <a:pt x="120000" y="120000"/>
+                </a:lnTo>
+                <a:lnTo>
+                  <a:pt x="0" y="120000"/>
+                </a:lnTo>
+                <a:close/>
+              </a:path>
+            </a:pathLst>
+          </a:custGeom>
+        </p:spPr>
+      </p:sp>
+      <p:sp>
+        <p:nvSpPr>
+          <p:cNvPr id="271" name="Google Shape;271;g35f391192_017:notes"/>
+          <p:cNvSpPr txBox="1">
+            <a:spLocks noGrp="1"/>
+          </p:cNvSpPr>
+          <p:nvPr>
+            <p:ph type="body" idx="1"/>
+          </p:nvPr>
+        </p:nvSpPr>
+        <p:spPr>
+          <a:xfrm>
+            <a:off x="685800" y="4343400"/>
+            <a:ext cx="5486400" cy="4114800"/>
+          </a:xfrm>
+          <a:prstGeom prst="rect">
+            <a:avLst/>
+          </a:prstGeom>
+        </p:spPr>
+        <p:txBody>
+          <a:bodyPr spcFirstLastPara="1" wrap="square" lIns="91425" tIns="91425" rIns="91425" bIns="91425" anchor="t" anchorCtr="0">
+            <a:noAutofit/>
+          </a:bodyPr>
+          <a:lstStyle/>
+          <a:p>
+            <a:pPr marL="0" lvl="0" indent="0" algn="l" rtl="0">
+              <a:spcBef>
+                <a:spcPts val="0"/>
+              </a:spcBef>
+              <a:spcAft>
+                <a:spcPts val="0"/>
+              </a:spcAft>
+              <a:buNone/>
+            </a:pPr>
+            <a:endParaRPr dirty="0"/>
+          </a:p>
+        </p:txBody>
+      </p:sp>
+    </p:spTree>
+    <p:extLst>
+      <p:ext uri="{BB962C8B-B14F-4D97-AF65-F5344CB8AC3E}">
+        <p14:creationId xmlns:p14="http://schemas.microsoft.com/office/powerpoint/2010/main" val="1532276427"/>
+      </p:ext>
+    </p:extLst>
+  </p:cSld>
+  <p:clrMapOvr>
+    <a:masterClrMapping/>
+  </p:clrMapOvr>
+</p:notes>
+</file>
+
+<file path=ppt/notesSlides/notesSlide12.xml><?xml version="1.0" encoding="utf-8"?>
+<p:notes xmlns:a="http://schemas.openxmlformats.org/drawingml/2006/main" xmlns:r="http://schemas.openxmlformats.org/officeDocument/2006/relationships" xmlns:p="http://schemas.openxmlformats.org/presentationml/2006/main" showMasterSp="0" showMasterPhAnim="0">
+  <p:cSld>
+    <p:spTree>
+      <p:nvGrpSpPr>
+        <p:cNvPr id="1" name="Shape 246"/>
+        <p:cNvGrpSpPr/>
+        <p:nvPr/>
+      </p:nvGrpSpPr>
+      <p:grpSpPr>
+        <a:xfrm>
+          <a:off x="0" y="0"/>
+          <a:ext cx="0" cy="0"/>
+          <a:chOff x="0" y="0"/>
+          <a:chExt cx="0" cy="0"/>
+        </a:xfrm>
+      </p:grpSpPr>
+      <p:sp>
+        <p:nvSpPr>
+          <p:cNvPr id="247" name="Google Shape;247;g35f391192_029:notes"/>
+          <p:cNvSpPr>
+            <a:spLocks noGrp="1" noRot="1" noChangeAspect="1"/>
+          </p:cNvSpPr>
+          <p:nvPr>
+            <p:ph type="sldImg" idx="2"/>
+          </p:nvPr>
+        </p:nvSpPr>
+        <p:spPr>
+          <a:xfrm>
+            <a:off x="381000" y="685800"/>
+            <a:ext cx="6096000" cy="3429000"/>
+          </a:xfrm>
+          <a:custGeom>
+            <a:avLst/>
+            <a:gdLst/>
+            <a:ahLst/>
+            <a:cxnLst/>
+            <a:rect l="l" t="t" r="r" b="b"/>
+            <a:pathLst>
+              <a:path w="120000" h="120000" extrusionOk="0">
+                <a:moveTo>
+                  <a:pt x="0" y="0"/>
+                </a:moveTo>
+                <a:lnTo>
+                  <a:pt x="120000" y="0"/>
+                </a:lnTo>
+                <a:lnTo>
+                  <a:pt x="120000" y="120000"/>
+                </a:lnTo>
+                <a:lnTo>
+                  <a:pt x="0" y="120000"/>
+                </a:lnTo>
+                <a:close/>
+              </a:path>
+            </a:pathLst>
+          </a:custGeom>
+        </p:spPr>
+      </p:sp>
+      <p:sp>
+        <p:nvSpPr>
+          <p:cNvPr id="248" name="Google Shape;248;g35f391192_029:notes"/>
+          <p:cNvSpPr txBox="1">
+            <a:spLocks noGrp="1"/>
+          </p:cNvSpPr>
+          <p:nvPr>
+            <p:ph type="body" idx="1"/>
+          </p:nvPr>
+        </p:nvSpPr>
+        <p:spPr>
+          <a:xfrm>
+            <a:off x="685800" y="4343400"/>
+            <a:ext cx="5486400" cy="4114800"/>
+          </a:xfrm>
+          <a:prstGeom prst="rect">
+            <a:avLst/>
+          </a:prstGeom>
+        </p:spPr>
+        <p:txBody>
+          <a:bodyPr spcFirstLastPara="1" wrap="square" lIns="91425" tIns="91425" rIns="91425" bIns="91425" anchor="t" anchorCtr="0">
+            <a:noAutofit/>
+          </a:bodyPr>
+          <a:lstStyle/>
+          <a:p>
+            <a:pPr marL="0" lvl="0" indent="0" algn="l" rtl="0">
+              <a:spcBef>
+                <a:spcPts val="0"/>
+              </a:spcBef>
+              <a:spcAft>
+                <a:spcPts val="0"/>
+              </a:spcAft>
+              <a:buNone/>
+            </a:pPr>
+            <a:endParaRPr/>
+          </a:p>
+        </p:txBody>
+      </p:sp>
+    </p:spTree>
+    <p:extLst>
+      <p:ext uri="{BB962C8B-B14F-4D97-AF65-F5344CB8AC3E}">
+        <p14:creationId xmlns:p14="http://schemas.microsoft.com/office/powerpoint/2010/main" val="804473836"/>
+      </p:ext>
+    </p:extLst>
+  </p:cSld>
+  <p:clrMapOvr>
+    <a:masterClrMapping/>
+  </p:clrMapOvr>
+</p:notes>
+</file>
+
+<file path=ppt/notesSlides/notesSlide13.xml><?xml version="1.0" encoding="utf-8"?>
+<p:notes xmlns:a="http://schemas.openxmlformats.org/drawingml/2006/main" xmlns:r="http://schemas.openxmlformats.org/officeDocument/2006/relationships" xmlns:p="http://schemas.openxmlformats.org/presentationml/2006/main" showMasterSp="0" showMasterPhAnim="0">
+  <p:cSld>
+    <p:spTree>
+      <p:nvGrpSpPr>
+        <p:cNvPr id="1" name="Shape 442"/>
+        <p:cNvGrpSpPr/>
+        <p:nvPr/>
+      </p:nvGrpSpPr>
+      <p:grpSpPr>
+        <a:xfrm>
+          <a:off x="0" y="0"/>
+          <a:ext cx="0" cy="0"/>
+          <a:chOff x="0" y="0"/>
+          <a:chExt cx="0" cy="0"/>
+        </a:xfrm>
+      </p:grpSpPr>
+      <p:sp>
+        <p:nvSpPr>
+          <p:cNvPr id="443" name="Google Shape;443;g35ed75ccf_0134:notes"/>
+          <p:cNvSpPr>
+            <a:spLocks noGrp="1" noRot="1" noChangeAspect="1"/>
+          </p:cNvSpPr>
+          <p:nvPr>
+            <p:ph type="sldImg" idx="2"/>
+          </p:nvPr>
+        </p:nvSpPr>
+        <p:spPr>
+          <a:xfrm>
+            <a:off x="381000" y="685800"/>
+            <a:ext cx="6096000" cy="3429000"/>
+          </a:xfrm>
+          <a:custGeom>
+            <a:avLst/>
+            <a:gdLst/>
+            <a:ahLst/>
+            <a:cxnLst/>
+            <a:rect l="l" t="t" r="r" b="b"/>
+            <a:pathLst>
+              <a:path w="120000" h="120000" extrusionOk="0">
+                <a:moveTo>
+                  <a:pt x="0" y="0"/>
+                </a:moveTo>
+                <a:lnTo>
+                  <a:pt x="120000" y="0"/>
+                </a:lnTo>
+                <a:lnTo>
+                  <a:pt x="120000" y="120000"/>
+                </a:lnTo>
+                <a:lnTo>
+                  <a:pt x="0" y="120000"/>
+                </a:lnTo>
+                <a:close/>
+              </a:path>
+            </a:pathLst>
+          </a:custGeom>
+        </p:spPr>
+      </p:sp>
+      <p:sp>
+        <p:nvSpPr>
+          <p:cNvPr id="444" name="Google Shape;444;g35ed75ccf_0134:notes"/>
+          <p:cNvSpPr txBox="1">
+            <a:spLocks noGrp="1"/>
+          </p:cNvSpPr>
+          <p:nvPr>
+            <p:ph type="body" idx="1"/>
+          </p:nvPr>
+        </p:nvSpPr>
+        <p:spPr>
+          <a:xfrm>
+            <a:off x="685800" y="4343400"/>
+            <a:ext cx="5486400" cy="4114800"/>
+          </a:xfrm>
+          <a:prstGeom prst="rect">
+            <a:avLst/>
+          </a:prstGeom>
+        </p:spPr>
+        <p:txBody>
+          <a:bodyPr spcFirstLastPara="1" wrap="square" lIns="91425" tIns="91425" rIns="91425" bIns="91425" anchor="t" anchorCtr="0">
+            <a:noAutofit/>
+          </a:bodyPr>
+          <a:lstStyle/>
+          <a:p>
+            <a:pPr marL="0" lvl="0" indent="0" algn="l" rtl="0">
+              <a:spcBef>
+                <a:spcPts val="0"/>
+              </a:spcBef>
+              <a:spcAft>
+                <a:spcPts val="0"/>
+              </a:spcAft>
+              <a:buNone/>
+            </a:pPr>
+            <a:endParaRPr/>
+          </a:p>
+        </p:txBody>
+      </p:sp>
+    </p:spTree>
+    <p:extLst>
+      <p:ext uri="{BB962C8B-B14F-4D97-AF65-F5344CB8AC3E}">
+        <p14:creationId xmlns:p14="http://schemas.microsoft.com/office/powerpoint/2010/main" val="1680375189"/>
+      </p:ext>
+    </p:extLst>
+  </p:cSld>
+  <p:clrMapOvr>
+    <a:masterClrMapping/>
+  </p:clrMapOvr>
+</p:notes>
+</file>
+
+<file path=ppt/notesSlides/notesSlide14.xml><?xml version="1.0" encoding="utf-8"?>
+<p:notes xmlns:a="http://schemas.openxmlformats.org/drawingml/2006/main" xmlns:r="http://schemas.openxmlformats.org/officeDocument/2006/relationships" xmlns:p="http://schemas.openxmlformats.org/presentationml/2006/main" showMasterSp="0" showMasterPhAnim="0">
+  <p:cSld>
+    <p:spTree>
+      <p:nvGrpSpPr>
+        <p:cNvPr id="1" name="Shape 246"/>
+        <p:cNvGrpSpPr/>
+        <p:nvPr/>
+      </p:nvGrpSpPr>
+      <p:grpSpPr>
+        <a:xfrm>
+          <a:off x="0" y="0"/>
+          <a:ext cx="0" cy="0"/>
+          <a:chOff x="0" y="0"/>
+          <a:chExt cx="0" cy="0"/>
+        </a:xfrm>
+      </p:grpSpPr>
+      <p:sp>
+        <p:nvSpPr>
+          <p:cNvPr id="247" name="Google Shape;247;g35f391192_029:notes"/>
+          <p:cNvSpPr>
+            <a:spLocks noGrp="1" noRot="1" noChangeAspect="1"/>
+          </p:cNvSpPr>
+          <p:nvPr>
+            <p:ph type="sldImg" idx="2"/>
+          </p:nvPr>
+        </p:nvSpPr>
+        <p:spPr>
+          <a:xfrm>
+            <a:off x="381000" y="685800"/>
+            <a:ext cx="6096000" cy="3429000"/>
+          </a:xfrm>
+          <a:custGeom>
+            <a:avLst/>
+            <a:gdLst/>
+            <a:ahLst/>
+            <a:cxnLst/>
+            <a:rect l="l" t="t" r="r" b="b"/>
+            <a:pathLst>
+              <a:path w="120000" h="120000" extrusionOk="0">
+                <a:moveTo>
+                  <a:pt x="0" y="0"/>
+                </a:moveTo>
+                <a:lnTo>
+                  <a:pt x="120000" y="0"/>
+                </a:lnTo>
+                <a:lnTo>
+                  <a:pt x="120000" y="120000"/>
+                </a:lnTo>
+                <a:lnTo>
+                  <a:pt x="0" y="120000"/>
+                </a:lnTo>
+                <a:close/>
+              </a:path>
+            </a:pathLst>
+          </a:custGeom>
+        </p:spPr>
+      </p:sp>
+      <p:sp>
+        <p:nvSpPr>
+          <p:cNvPr id="248" name="Google Shape;248;g35f391192_029:notes"/>
+          <p:cNvSpPr txBox="1">
+            <a:spLocks noGrp="1"/>
+          </p:cNvSpPr>
+          <p:nvPr>
+            <p:ph type="body" idx="1"/>
+          </p:nvPr>
+        </p:nvSpPr>
+        <p:spPr>
+          <a:xfrm>
+            <a:off x="685800" y="4343400"/>
+            <a:ext cx="5486400" cy="4114800"/>
+          </a:xfrm>
+          <a:prstGeom prst="rect">
+            <a:avLst/>
+          </a:prstGeom>
+        </p:spPr>
+        <p:txBody>
+          <a:bodyPr spcFirstLastPara="1" wrap="square" lIns="91425" tIns="91425" rIns="91425" bIns="91425" anchor="t" anchorCtr="0">
+            <a:noAutofit/>
+          </a:bodyPr>
+          <a:lstStyle/>
+          <a:p>
+            <a:pPr marL="0" lvl="0" indent="0" algn="l" rtl="0">
+              <a:spcBef>
+                <a:spcPts val="0"/>
+              </a:spcBef>
+              <a:spcAft>
+                <a:spcPts val="0"/>
+              </a:spcAft>
+              <a:buNone/>
+            </a:pPr>
+            <a:endParaRPr/>
+          </a:p>
+        </p:txBody>
+      </p:sp>
+    </p:spTree>
+    <p:extLst>
+      <p:ext uri="{BB962C8B-B14F-4D97-AF65-F5344CB8AC3E}">
+        <p14:creationId xmlns:p14="http://schemas.microsoft.com/office/powerpoint/2010/main" val="1392461915"/>
+      </p:ext>
+    </p:extLst>
+  </p:cSld>
+  <p:clrMapOvr>
+    <a:masterClrMapping/>
+  </p:clrMapOvr>
+</p:notes>
+</file>
+
+<file path=ppt/notesSlides/notesSlide15.xml><?xml version="1.0" encoding="utf-8"?>
+<p:notes xmlns:a="http://schemas.openxmlformats.org/drawingml/2006/main" xmlns:r="http://schemas.openxmlformats.org/officeDocument/2006/relationships" xmlns:p="http://schemas.openxmlformats.org/presentationml/2006/main" showMasterSp="0" showMasterPhAnim="0">
+  <p:cSld>
+    <p:spTree>
+      <p:nvGrpSpPr>
+        <p:cNvPr id="1" name="Shape 277"/>
+        <p:cNvGrpSpPr/>
+        <p:nvPr/>
+      </p:nvGrpSpPr>
+      <p:grpSpPr>
+        <a:xfrm>
+          <a:off x="0" y="0"/>
+          <a:ext cx="0" cy="0"/>
+          <a:chOff x="0" y="0"/>
+          <a:chExt cx="0" cy="0"/>
+        </a:xfrm>
+      </p:grpSpPr>
+      <p:sp>
+        <p:nvSpPr>
+          <p:cNvPr id="278" name="Google Shape;278;g35f391192_045:notes"/>
+          <p:cNvSpPr>
+            <a:spLocks noGrp="1" noRot="1" noChangeAspect="1"/>
+          </p:cNvSpPr>
+          <p:nvPr>
+            <p:ph type="sldImg" idx="2"/>
+          </p:nvPr>
+        </p:nvSpPr>
+        <p:spPr>
+          <a:xfrm>
+            <a:off x="381000" y="685800"/>
+            <a:ext cx="6096000" cy="3429000"/>
+          </a:xfrm>
+          <a:custGeom>
+            <a:avLst/>
+            <a:gdLst/>
+            <a:ahLst/>
+            <a:cxnLst/>
+            <a:rect l="l" t="t" r="r" b="b"/>
+            <a:pathLst>
+              <a:path w="120000" h="120000" extrusionOk="0">
+                <a:moveTo>
+                  <a:pt x="0" y="0"/>
+                </a:moveTo>
+                <a:lnTo>
+                  <a:pt x="120000" y="0"/>
+                </a:lnTo>
+                <a:lnTo>
+                  <a:pt x="120000" y="120000"/>
+                </a:lnTo>
+                <a:lnTo>
+                  <a:pt x="0" y="120000"/>
+                </a:lnTo>
+                <a:close/>
+              </a:path>
+            </a:pathLst>
+          </a:custGeom>
+        </p:spPr>
+      </p:sp>
+      <p:sp>
+        <p:nvSpPr>
+          <p:cNvPr id="279" name="Google Shape;279;g35f391192_045:notes"/>
+          <p:cNvSpPr txBox="1">
+            <a:spLocks noGrp="1"/>
+          </p:cNvSpPr>
+          <p:nvPr>
+            <p:ph type="body" idx="1"/>
+          </p:nvPr>
+        </p:nvSpPr>
+        <p:spPr>
+          <a:xfrm>
+            <a:off x="685800" y="4343400"/>
+            <a:ext cx="5486400" cy="4114800"/>
+          </a:xfrm>
+          <a:prstGeom prst="rect">
+            <a:avLst/>
+          </a:prstGeom>
+        </p:spPr>
+        <p:txBody>
+          <a:bodyPr spcFirstLastPara="1" wrap="square" lIns="91425" tIns="91425" rIns="91425" bIns="91425" anchor="t" anchorCtr="0">
+            <a:noAutofit/>
+          </a:bodyPr>
+          <a:lstStyle/>
+          <a:p>
+            <a:pPr marL="0" lvl="0" indent="0" algn="l" rtl="0">
+              <a:spcBef>
+                <a:spcPts val="0"/>
+              </a:spcBef>
+              <a:spcAft>
+                <a:spcPts val="0"/>
+              </a:spcAft>
+              <a:buNone/>
+            </a:pPr>
+            <a:endParaRPr/>
+          </a:p>
+        </p:txBody>
+      </p:sp>
+    </p:spTree>
+    <p:extLst>
+      <p:ext uri="{BB962C8B-B14F-4D97-AF65-F5344CB8AC3E}">
+        <p14:creationId xmlns:p14="http://schemas.microsoft.com/office/powerpoint/2010/main" val="718088807"/>
+      </p:ext>
+    </p:extLst>
+  </p:cSld>
+  <p:clrMapOvr>
+    <a:masterClrMapping/>
+  </p:clrMapOvr>
+</p:notes>
+</file>
+
+<file path=ppt/notesSlides/notesSlide16.xml><?xml version="1.0" encoding="utf-8"?>
 <p:notes xmlns:a="http://schemas.openxmlformats.org/drawingml/2006/main" xmlns:r="http://schemas.openxmlformats.org/officeDocument/2006/relationships" xmlns:p="http://schemas.openxmlformats.org/presentationml/2006/main" showMasterSp="0" showMasterPhAnim="0">
   <p:cSld>
     <p:spTree>
@@ -1071,552 +1616,7 @@
     </p:spTree>
     <p:extLst>
       <p:ext uri="{BB962C8B-B14F-4D97-AF65-F5344CB8AC3E}">
-        <p14:creationId xmlns:p14="http://schemas.microsoft.com/office/powerpoint/2010/main" val="3122360990"/>
-      </p:ext>
-    </p:extLst>
-  </p:cSld>
-  <p:clrMapOvr>
-    <a:masterClrMapping/>
-  </p:clrMapOvr>
-</p:notes>
-</file>
-
-<file path=ppt/notesSlides/notesSlide12.xml><?xml version="1.0" encoding="utf-8"?>
-<p:notes xmlns:a="http://schemas.openxmlformats.org/drawingml/2006/main" xmlns:r="http://schemas.openxmlformats.org/officeDocument/2006/relationships" xmlns:p="http://schemas.openxmlformats.org/presentationml/2006/main" showMasterSp="0" showMasterPhAnim="0">
-  <p:cSld>
-    <p:spTree>
-      <p:nvGrpSpPr>
-        <p:cNvPr id="1" name="Shape 269"/>
-        <p:cNvGrpSpPr/>
-        <p:nvPr/>
-      </p:nvGrpSpPr>
-      <p:grpSpPr>
-        <a:xfrm>
-          <a:off x="0" y="0"/>
-          <a:ext cx="0" cy="0"/>
-          <a:chOff x="0" y="0"/>
-          <a:chExt cx="0" cy="0"/>
-        </a:xfrm>
-      </p:grpSpPr>
-      <p:sp>
-        <p:nvSpPr>
-          <p:cNvPr id="270" name="Google Shape;270;g35f391192_017:notes"/>
-          <p:cNvSpPr>
-            <a:spLocks noGrp="1" noRot="1" noChangeAspect="1"/>
-          </p:cNvSpPr>
-          <p:nvPr>
-            <p:ph type="sldImg" idx="2"/>
-          </p:nvPr>
-        </p:nvSpPr>
-        <p:spPr>
-          <a:xfrm>
-            <a:off x="381000" y="685800"/>
-            <a:ext cx="6096000" cy="3429000"/>
-          </a:xfrm>
-          <a:custGeom>
-            <a:avLst/>
-            <a:gdLst/>
-            <a:ahLst/>
-            <a:cxnLst/>
-            <a:rect l="l" t="t" r="r" b="b"/>
-            <a:pathLst>
-              <a:path w="120000" h="120000" extrusionOk="0">
-                <a:moveTo>
-                  <a:pt x="0" y="0"/>
-                </a:moveTo>
-                <a:lnTo>
-                  <a:pt x="120000" y="0"/>
-                </a:lnTo>
-                <a:lnTo>
-                  <a:pt x="120000" y="120000"/>
-                </a:lnTo>
-                <a:lnTo>
-                  <a:pt x="0" y="120000"/>
-                </a:lnTo>
-                <a:close/>
-              </a:path>
-            </a:pathLst>
-          </a:custGeom>
-        </p:spPr>
-      </p:sp>
-      <p:sp>
-        <p:nvSpPr>
-          <p:cNvPr id="271" name="Google Shape;271;g35f391192_017:notes"/>
-          <p:cNvSpPr txBox="1">
-            <a:spLocks noGrp="1"/>
-          </p:cNvSpPr>
-          <p:nvPr>
-            <p:ph type="body" idx="1"/>
-          </p:nvPr>
-        </p:nvSpPr>
-        <p:spPr>
-          <a:xfrm>
-            <a:off x="685800" y="4343400"/>
-            <a:ext cx="5486400" cy="4114800"/>
-          </a:xfrm>
-          <a:prstGeom prst="rect">
-            <a:avLst/>
-          </a:prstGeom>
-        </p:spPr>
-        <p:txBody>
-          <a:bodyPr spcFirstLastPara="1" wrap="square" lIns="91425" tIns="91425" rIns="91425" bIns="91425" anchor="t" anchorCtr="0">
-            <a:noAutofit/>
-          </a:bodyPr>
-          <a:lstStyle/>
-          <a:p>
-            <a:pPr marL="0" lvl="0" indent="0" algn="l" rtl="0">
-              <a:spcBef>
-                <a:spcPts val="0"/>
-              </a:spcBef>
-              <a:spcAft>
-                <a:spcPts val="0"/>
-              </a:spcAft>
-              <a:buNone/>
-            </a:pPr>
-            <a:endParaRPr dirty="0"/>
-          </a:p>
-        </p:txBody>
-      </p:sp>
-    </p:spTree>
-    <p:extLst>
-      <p:ext uri="{BB962C8B-B14F-4D97-AF65-F5344CB8AC3E}">
-        <p14:creationId xmlns:p14="http://schemas.microsoft.com/office/powerpoint/2010/main" val="1532276427"/>
-      </p:ext>
-    </p:extLst>
-  </p:cSld>
-  <p:clrMapOvr>
-    <a:masterClrMapping/>
-  </p:clrMapOvr>
-</p:notes>
-</file>
-
-<file path=ppt/notesSlides/notesSlide13.xml><?xml version="1.0" encoding="utf-8"?>
-<p:notes xmlns:a="http://schemas.openxmlformats.org/drawingml/2006/main" xmlns:r="http://schemas.openxmlformats.org/officeDocument/2006/relationships" xmlns:p="http://schemas.openxmlformats.org/presentationml/2006/main" showMasterSp="0" showMasterPhAnim="0">
-  <p:cSld>
-    <p:spTree>
-      <p:nvGrpSpPr>
-        <p:cNvPr id="1" name="Shape 246"/>
-        <p:cNvGrpSpPr/>
-        <p:nvPr/>
-      </p:nvGrpSpPr>
-      <p:grpSpPr>
-        <a:xfrm>
-          <a:off x="0" y="0"/>
-          <a:ext cx="0" cy="0"/>
-          <a:chOff x="0" y="0"/>
-          <a:chExt cx="0" cy="0"/>
-        </a:xfrm>
-      </p:grpSpPr>
-      <p:sp>
-        <p:nvSpPr>
-          <p:cNvPr id="247" name="Google Shape;247;g35f391192_029:notes"/>
-          <p:cNvSpPr>
-            <a:spLocks noGrp="1" noRot="1" noChangeAspect="1"/>
-          </p:cNvSpPr>
-          <p:nvPr>
-            <p:ph type="sldImg" idx="2"/>
-          </p:nvPr>
-        </p:nvSpPr>
-        <p:spPr>
-          <a:xfrm>
-            <a:off x="381000" y="685800"/>
-            <a:ext cx="6096000" cy="3429000"/>
-          </a:xfrm>
-          <a:custGeom>
-            <a:avLst/>
-            <a:gdLst/>
-            <a:ahLst/>
-            <a:cxnLst/>
-            <a:rect l="l" t="t" r="r" b="b"/>
-            <a:pathLst>
-              <a:path w="120000" h="120000" extrusionOk="0">
-                <a:moveTo>
-                  <a:pt x="0" y="0"/>
-                </a:moveTo>
-                <a:lnTo>
-                  <a:pt x="120000" y="0"/>
-                </a:lnTo>
-                <a:lnTo>
-                  <a:pt x="120000" y="120000"/>
-                </a:lnTo>
-                <a:lnTo>
-                  <a:pt x="0" y="120000"/>
-                </a:lnTo>
-                <a:close/>
-              </a:path>
-            </a:pathLst>
-          </a:custGeom>
-        </p:spPr>
-      </p:sp>
-      <p:sp>
-        <p:nvSpPr>
-          <p:cNvPr id="248" name="Google Shape;248;g35f391192_029:notes"/>
-          <p:cNvSpPr txBox="1">
-            <a:spLocks noGrp="1"/>
-          </p:cNvSpPr>
-          <p:nvPr>
-            <p:ph type="body" idx="1"/>
-          </p:nvPr>
-        </p:nvSpPr>
-        <p:spPr>
-          <a:xfrm>
-            <a:off x="685800" y="4343400"/>
-            <a:ext cx="5486400" cy="4114800"/>
-          </a:xfrm>
-          <a:prstGeom prst="rect">
-            <a:avLst/>
-          </a:prstGeom>
-        </p:spPr>
-        <p:txBody>
-          <a:bodyPr spcFirstLastPara="1" wrap="square" lIns="91425" tIns="91425" rIns="91425" bIns="91425" anchor="t" anchorCtr="0">
-            <a:noAutofit/>
-          </a:bodyPr>
-          <a:lstStyle/>
-          <a:p>
-            <a:pPr marL="0" lvl="0" indent="0" algn="l" rtl="0">
-              <a:spcBef>
-                <a:spcPts val="0"/>
-              </a:spcBef>
-              <a:spcAft>
-                <a:spcPts val="0"/>
-              </a:spcAft>
-              <a:buNone/>
-            </a:pPr>
-            <a:endParaRPr/>
-          </a:p>
-        </p:txBody>
-      </p:sp>
-    </p:spTree>
-    <p:extLst>
-      <p:ext uri="{BB962C8B-B14F-4D97-AF65-F5344CB8AC3E}">
-        <p14:creationId xmlns:p14="http://schemas.microsoft.com/office/powerpoint/2010/main" val="804473836"/>
-      </p:ext>
-    </p:extLst>
-  </p:cSld>
-  <p:clrMapOvr>
-    <a:masterClrMapping/>
-  </p:clrMapOvr>
-</p:notes>
-</file>
-
-<file path=ppt/notesSlides/notesSlide14.xml><?xml version="1.0" encoding="utf-8"?>
-<p:notes xmlns:a="http://schemas.openxmlformats.org/drawingml/2006/main" xmlns:r="http://schemas.openxmlformats.org/officeDocument/2006/relationships" xmlns:p="http://schemas.openxmlformats.org/presentationml/2006/main" showMasterSp="0" showMasterPhAnim="0">
-  <p:cSld>
-    <p:spTree>
-      <p:nvGrpSpPr>
-        <p:cNvPr id="1" name="Shape 442"/>
-        <p:cNvGrpSpPr/>
-        <p:nvPr/>
-      </p:nvGrpSpPr>
-      <p:grpSpPr>
-        <a:xfrm>
-          <a:off x="0" y="0"/>
-          <a:ext cx="0" cy="0"/>
-          <a:chOff x="0" y="0"/>
-          <a:chExt cx="0" cy="0"/>
-        </a:xfrm>
-      </p:grpSpPr>
-      <p:sp>
-        <p:nvSpPr>
-          <p:cNvPr id="443" name="Google Shape;443;g35ed75ccf_0134:notes"/>
-          <p:cNvSpPr>
-            <a:spLocks noGrp="1" noRot="1" noChangeAspect="1"/>
-          </p:cNvSpPr>
-          <p:nvPr>
-            <p:ph type="sldImg" idx="2"/>
-          </p:nvPr>
-        </p:nvSpPr>
-        <p:spPr>
-          <a:xfrm>
-            <a:off x="381000" y="685800"/>
-            <a:ext cx="6096000" cy="3429000"/>
-          </a:xfrm>
-          <a:custGeom>
-            <a:avLst/>
-            <a:gdLst/>
-            <a:ahLst/>
-            <a:cxnLst/>
-            <a:rect l="l" t="t" r="r" b="b"/>
-            <a:pathLst>
-              <a:path w="120000" h="120000" extrusionOk="0">
-                <a:moveTo>
-                  <a:pt x="0" y="0"/>
-                </a:moveTo>
-                <a:lnTo>
-                  <a:pt x="120000" y="0"/>
-                </a:lnTo>
-                <a:lnTo>
-                  <a:pt x="120000" y="120000"/>
-                </a:lnTo>
-                <a:lnTo>
-                  <a:pt x="0" y="120000"/>
-                </a:lnTo>
-                <a:close/>
-              </a:path>
-            </a:pathLst>
-          </a:custGeom>
-        </p:spPr>
-      </p:sp>
-      <p:sp>
-        <p:nvSpPr>
-          <p:cNvPr id="444" name="Google Shape;444;g35ed75ccf_0134:notes"/>
-          <p:cNvSpPr txBox="1">
-            <a:spLocks noGrp="1"/>
-          </p:cNvSpPr>
-          <p:nvPr>
-            <p:ph type="body" idx="1"/>
-          </p:nvPr>
-        </p:nvSpPr>
-        <p:spPr>
-          <a:xfrm>
-            <a:off x="685800" y="4343400"/>
-            <a:ext cx="5486400" cy="4114800"/>
-          </a:xfrm>
-          <a:prstGeom prst="rect">
-            <a:avLst/>
-          </a:prstGeom>
-        </p:spPr>
-        <p:txBody>
-          <a:bodyPr spcFirstLastPara="1" wrap="square" lIns="91425" tIns="91425" rIns="91425" bIns="91425" anchor="t" anchorCtr="0">
-            <a:noAutofit/>
-          </a:bodyPr>
-          <a:lstStyle/>
-          <a:p>
-            <a:pPr marL="0" lvl="0" indent="0" algn="l" rtl="0">
-              <a:spcBef>
-                <a:spcPts val="0"/>
-              </a:spcBef>
-              <a:spcAft>
-                <a:spcPts val="0"/>
-              </a:spcAft>
-              <a:buNone/>
-            </a:pPr>
-            <a:endParaRPr/>
-          </a:p>
-        </p:txBody>
-      </p:sp>
-    </p:spTree>
-    <p:extLst>
-      <p:ext uri="{BB962C8B-B14F-4D97-AF65-F5344CB8AC3E}">
-        <p14:creationId xmlns:p14="http://schemas.microsoft.com/office/powerpoint/2010/main" val="1680375189"/>
-      </p:ext>
-    </p:extLst>
-  </p:cSld>
-  <p:clrMapOvr>
-    <a:masterClrMapping/>
-  </p:clrMapOvr>
-</p:notes>
-</file>
-
-<file path=ppt/notesSlides/notesSlide15.xml><?xml version="1.0" encoding="utf-8"?>
-<p:notes xmlns:a="http://schemas.openxmlformats.org/drawingml/2006/main" xmlns:r="http://schemas.openxmlformats.org/officeDocument/2006/relationships" xmlns:p="http://schemas.openxmlformats.org/presentationml/2006/main" showMasterSp="0" showMasterPhAnim="0">
-  <p:cSld>
-    <p:spTree>
-      <p:nvGrpSpPr>
-        <p:cNvPr id="1" name="Shape 246"/>
-        <p:cNvGrpSpPr/>
-        <p:nvPr/>
-      </p:nvGrpSpPr>
-      <p:grpSpPr>
-        <a:xfrm>
-          <a:off x="0" y="0"/>
-          <a:ext cx="0" cy="0"/>
-          <a:chOff x="0" y="0"/>
-          <a:chExt cx="0" cy="0"/>
-        </a:xfrm>
-      </p:grpSpPr>
-      <p:sp>
-        <p:nvSpPr>
-          <p:cNvPr id="247" name="Google Shape;247;g35f391192_029:notes"/>
-          <p:cNvSpPr>
-            <a:spLocks noGrp="1" noRot="1" noChangeAspect="1"/>
-          </p:cNvSpPr>
-          <p:nvPr>
-            <p:ph type="sldImg" idx="2"/>
-          </p:nvPr>
-        </p:nvSpPr>
-        <p:spPr>
-          <a:xfrm>
-            <a:off x="381000" y="685800"/>
-            <a:ext cx="6096000" cy="3429000"/>
-          </a:xfrm>
-          <a:custGeom>
-            <a:avLst/>
-            <a:gdLst/>
-            <a:ahLst/>
-            <a:cxnLst/>
-            <a:rect l="l" t="t" r="r" b="b"/>
-            <a:pathLst>
-              <a:path w="120000" h="120000" extrusionOk="0">
-                <a:moveTo>
-                  <a:pt x="0" y="0"/>
-                </a:moveTo>
-                <a:lnTo>
-                  <a:pt x="120000" y="0"/>
-                </a:lnTo>
-                <a:lnTo>
-                  <a:pt x="120000" y="120000"/>
-                </a:lnTo>
-                <a:lnTo>
-                  <a:pt x="0" y="120000"/>
-                </a:lnTo>
-                <a:close/>
-              </a:path>
-            </a:pathLst>
-          </a:custGeom>
-        </p:spPr>
-      </p:sp>
-      <p:sp>
-        <p:nvSpPr>
-          <p:cNvPr id="248" name="Google Shape;248;g35f391192_029:notes"/>
-          <p:cNvSpPr txBox="1">
-            <a:spLocks noGrp="1"/>
-          </p:cNvSpPr>
-          <p:nvPr>
-            <p:ph type="body" idx="1"/>
-          </p:nvPr>
-        </p:nvSpPr>
-        <p:spPr>
-          <a:xfrm>
-            <a:off x="685800" y="4343400"/>
-            <a:ext cx="5486400" cy="4114800"/>
-          </a:xfrm>
-          <a:prstGeom prst="rect">
-            <a:avLst/>
-          </a:prstGeom>
-        </p:spPr>
-        <p:txBody>
-          <a:bodyPr spcFirstLastPara="1" wrap="square" lIns="91425" tIns="91425" rIns="91425" bIns="91425" anchor="t" anchorCtr="0">
-            <a:noAutofit/>
-          </a:bodyPr>
-          <a:lstStyle/>
-          <a:p>
-            <a:pPr marL="0" lvl="0" indent="0" algn="l" rtl="0">
-              <a:spcBef>
-                <a:spcPts val="0"/>
-              </a:spcBef>
-              <a:spcAft>
-                <a:spcPts val="0"/>
-              </a:spcAft>
-              <a:buNone/>
-            </a:pPr>
-            <a:endParaRPr/>
-          </a:p>
-        </p:txBody>
-      </p:sp>
-    </p:spTree>
-    <p:extLst>
-      <p:ext uri="{BB962C8B-B14F-4D97-AF65-F5344CB8AC3E}">
-        <p14:creationId xmlns:p14="http://schemas.microsoft.com/office/powerpoint/2010/main" val="1392461915"/>
-      </p:ext>
-    </p:extLst>
-  </p:cSld>
-  <p:clrMapOvr>
-    <a:masterClrMapping/>
-  </p:clrMapOvr>
-</p:notes>
-</file>
-
-<file path=ppt/notesSlides/notesSlide16.xml><?xml version="1.0" encoding="utf-8"?>
-<p:notes xmlns:a="http://schemas.openxmlformats.org/drawingml/2006/main" xmlns:r="http://schemas.openxmlformats.org/officeDocument/2006/relationships" xmlns:p="http://schemas.openxmlformats.org/presentationml/2006/main" showMasterSp="0" showMasterPhAnim="0">
-  <p:cSld>
-    <p:spTree>
-      <p:nvGrpSpPr>
-        <p:cNvPr id="1" name="Shape 277"/>
-        <p:cNvGrpSpPr/>
-        <p:nvPr/>
-      </p:nvGrpSpPr>
-      <p:grpSpPr>
-        <a:xfrm>
-          <a:off x="0" y="0"/>
-          <a:ext cx="0" cy="0"/>
-          <a:chOff x="0" y="0"/>
-          <a:chExt cx="0" cy="0"/>
-        </a:xfrm>
-      </p:grpSpPr>
-      <p:sp>
-        <p:nvSpPr>
-          <p:cNvPr id="278" name="Google Shape;278;g35f391192_045:notes"/>
-          <p:cNvSpPr>
-            <a:spLocks noGrp="1" noRot="1" noChangeAspect="1"/>
-          </p:cNvSpPr>
-          <p:nvPr>
-            <p:ph type="sldImg" idx="2"/>
-          </p:nvPr>
-        </p:nvSpPr>
-        <p:spPr>
-          <a:xfrm>
-            <a:off x="381000" y="685800"/>
-            <a:ext cx="6096000" cy="3429000"/>
-          </a:xfrm>
-          <a:custGeom>
-            <a:avLst/>
-            <a:gdLst/>
-            <a:ahLst/>
-            <a:cxnLst/>
-            <a:rect l="l" t="t" r="r" b="b"/>
-            <a:pathLst>
-              <a:path w="120000" h="120000" extrusionOk="0">
-                <a:moveTo>
-                  <a:pt x="0" y="0"/>
-                </a:moveTo>
-                <a:lnTo>
-                  <a:pt x="120000" y="0"/>
-                </a:lnTo>
-                <a:lnTo>
-                  <a:pt x="120000" y="120000"/>
-                </a:lnTo>
-                <a:lnTo>
-                  <a:pt x="0" y="120000"/>
-                </a:lnTo>
-                <a:close/>
-              </a:path>
-            </a:pathLst>
-          </a:custGeom>
-        </p:spPr>
-      </p:sp>
-      <p:sp>
-        <p:nvSpPr>
-          <p:cNvPr id="279" name="Google Shape;279;g35f391192_045:notes"/>
-          <p:cNvSpPr txBox="1">
-            <a:spLocks noGrp="1"/>
-          </p:cNvSpPr>
-          <p:nvPr>
-            <p:ph type="body" idx="1"/>
-          </p:nvPr>
-        </p:nvSpPr>
-        <p:spPr>
-          <a:xfrm>
-            <a:off x="685800" y="4343400"/>
-            <a:ext cx="5486400" cy="4114800"/>
-          </a:xfrm>
-          <a:prstGeom prst="rect">
-            <a:avLst/>
-          </a:prstGeom>
-        </p:spPr>
-        <p:txBody>
-          <a:bodyPr spcFirstLastPara="1" wrap="square" lIns="91425" tIns="91425" rIns="91425" bIns="91425" anchor="t" anchorCtr="0">
-            <a:noAutofit/>
-          </a:bodyPr>
-          <a:lstStyle/>
-          <a:p>
-            <a:pPr marL="0" lvl="0" indent="0" algn="l" rtl="0">
-              <a:spcBef>
-                <a:spcPts val="0"/>
-              </a:spcBef>
-              <a:spcAft>
-                <a:spcPts val="0"/>
-              </a:spcAft>
-              <a:buNone/>
-            </a:pPr>
-            <a:endParaRPr/>
-          </a:p>
-        </p:txBody>
-      </p:sp>
-    </p:spTree>
-    <p:extLst>
-      <p:ext uri="{BB962C8B-B14F-4D97-AF65-F5344CB8AC3E}">
-        <p14:creationId xmlns:p14="http://schemas.microsoft.com/office/powerpoint/2010/main" val="718088807"/>
+        <p14:creationId xmlns:p14="http://schemas.microsoft.com/office/powerpoint/2010/main" val="2231081227"/>
       </p:ext>
     </p:extLst>
   </p:cSld>
@@ -2270,7 +2270,7 @@
     </p:spTree>
     <p:extLst>
       <p:ext uri="{BB962C8B-B14F-4D97-AF65-F5344CB8AC3E}">
-        <p14:creationId xmlns:p14="http://schemas.microsoft.com/office/powerpoint/2010/main" val="381360011"/>
+        <p14:creationId xmlns:p14="http://schemas.microsoft.com/office/powerpoint/2010/main" val="773173914"/>
       </p:ext>
     </p:extLst>
   </p:cSld>
@@ -2285,7 +2285,7 @@
   <p:cSld>
     <p:spTree>
       <p:nvGrpSpPr>
-        <p:cNvPr id="1" name="Shape 442"/>
+        <p:cNvPr id="1" name="Shape 277"/>
         <p:cNvGrpSpPr/>
         <p:nvPr/>
       </p:nvGrpSpPr>
@@ -2299,7 +2299,7 @@
       </p:grpSpPr>
       <p:sp>
         <p:nvSpPr>
-          <p:cNvPr id="443" name="Google Shape;443;g35ed75ccf_0134:notes"/>
+          <p:cNvPr id="278" name="Google Shape;278;g35f391192_045:notes"/>
           <p:cNvSpPr>
             <a:spLocks noGrp="1" noRot="1" noChangeAspect="1"/>
           </p:cNvSpPr>
@@ -2340,7 +2340,7 @@
       </p:sp>
       <p:sp>
         <p:nvSpPr>
-          <p:cNvPr id="444" name="Google Shape;444;g35ed75ccf_0134:notes"/>
+          <p:cNvPr id="279" name="Google Shape;279;g35f391192_045:notes"/>
           <p:cNvSpPr txBox="1">
             <a:spLocks noGrp="1"/>
           </p:cNvSpPr>
@@ -2379,7 +2379,7 @@
     </p:spTree>
     <p:extLst>
       <p:ext uri="{BB962C8B-B14F-4D97-AF65-F5344CB8AC3E}">
-        <p14:creationId xmlns:p14="http://schemas.microsoft.com/office/powerpoint/2010/main" val="773173914"/>
+        <p14:creationId xmlns:p14="http://schemas.microsoft.com/office/powerpoint/2010/main" val="974265713"/>
       </p:ext>
     </p:extLst>
   </p:cSld>
@@ -2488,7 +2488,7 @@
     </p:spTree>
     <p:extLst>
       <p:ext uri="{BB962C8B-B14F-4D97-AF65-F5344CB8AC3E}">
-        <p14:creationId xmlns:p14="http://schemas.microsoft.com/office/powerpoint/2010/main" val="974265713"/>
+        <p14:creationId xmlns:p14="http://schemas.microsoft.com/office/powerpoint/2010/main" val="3783563285"/>
       </p:ext>
     </p:extLst>
   </p:cSld>
@@ -2597,7 +2597,7 @@
     </p:spTree>
     <p:extLst>
       <p:ext uri="{BB962C8B-B14F-4D97-AF65-F5344CB8AC3E}">
-        <p14:creationId xmlns:p14="http://schemas.microsoft.com/office/powerpoint/2010/main" val="3783563285"/>
+        <p14:creationId xmlns:p14="http://schemas.microsoft.com/office/powerpoint/2010/main" val="1198525262"/>
       </p:ext>
     </p:extLst>
   </p:cSld>
@@ -2608,115 +2608,6 @@
 </file>
 
 <file path=ppt/notesSlides/notesSlide7.xml><?xml version="1.0" encoding="utf-8"?>
-<p:notes xmlns:a="http://schemas.openxmlformats.org/drawingml/2006/main" xmlns:r="http://schemas.openxmlformats.org/officeDocument/2006/relationships" xmlns:p="http://schemas.openxmlformats.org/presentationml/2006/main" showMasterSp="0" showMasterPhAnim="0">
-  <p:cSld>
-    <p:spTree>
-      <p:nvGrpSpPr>
-        <p:cNvPr id="1" name="Shape 277"/>
-        <p:cNvGrpSpPr/>
-        <p:nvPr/>
-      </p:nvGrpSpPr>
-      <p:grpSpPr>
-        <a:xfrm>
-          <a:off x="0" y="0"/>
-          <a:ext cx="0" cy="0"/>
-          <a:chOff x="0" y="0"/>
-          <a:chExt cx="0" cy="0"/>
-        </a:xfrm>
-      </p:grpSpPr>
-      <p:sp>
-        <p:nvSpPr>
-          <p:cNvPr id="278" name="Google Shape;278;g35f391192_045:notes"/>
-          <p:cNvSpPr>
-            <a:spLocks noGrp="1" noRot="1" noChangeAspect="1"/>
-          </p:cNvSpPr>
-          <p:nvPr>
-            <p:ph type="sldImg" idx="2"/>
-          </p:nvPr>
-        </p:nvSpPr>
-        <p:spPr>
-          <a:xfrm>
-            <a:off x="381000" y="685800"/>
-            <a:ext cx="6096000" cy="3429000"/>
-          </a:xfrm>
-          <a:custGeom>
-            <a:avLst/>
-            <a:gdLst/>
-            <a:ahLst/>
-            <a:cxnLst/>
-            <a:rect l="l" t="t" r="r" b="b"/>
-            <a:pathLst>
-              <a:path w="120000" h="120000" extrusionOk="0">
-                <a:moveTo>
-                  <a:pt x="0" y="0"/>
-                </a:moveTo>
-                <a:lnTo>
-                  <a:pt x="120000" y="0"/>
-                </a:lnTo>
-                <a:lnTo>
-                  <a:pt x="120000" y="120000"/>
-                </a:lnTo>
-                <a:lnTo>
-                  <a:pt x="0" y="120000"/>
-                </a:lnTo>
-                <a:close/>
-              </a:path>
-            </a:pathLst>
-          </a:custGeom>
-        </p:spPr>
-      </p:sp>
-      <p:sp>
-        <p:nvSpPr>
-          <p:cNvPr id="279" name="Google Shape;279;g35f391192_045:notes"/>
-          <p:cNvSpPr txBox="1">
-            <a:spLocks noGrp="1"/>
-          </p:cNvSpPr>
-          <p:nvPr>
-            <p:ph type="body" idx="1"/>
-          </p:nvPr>
-        </p:nvSpPr>
-        <p:spPr>
-          <a:xfrm>
-            <a:off x="685800" y="4343400"/>
-            <a:ext cx="5486400" cy="4114800"/>
-          </a:xfrm>
-          <a:prstGeom prst="rect">
-            <a:avLst/>
-          </a:prstGeom>
-        </p:spPr>
-        <p:txBody>
-          <a:bodyPr spcFirstLastPara="1" wrap="square" lIns="91425" tIns="91425" rIns="91425" bIns="91425" anchor="t" anchorCtr="0">
-            <a:noAutofit/>
-          </a:bodyPr>
-          <a:lstStyle/>
-          <a:p>
-            <a:pPr marL="0" lvl="0" indent="0" algn="l" rtl="0">
-              <a:spcBef>
-                <a:spcPts val="0"/>
-              </a:spcBef>
-              <a:spcAft>
-                <a:spcPts val="0"/>
-              </a:spcAft>
-              <a:buNone/>
-            </a:pPr>
-            <a:endParaRPr/>
-          </a:p>
-        </p:txBody>
-      </p:sp>
-    </p:spTree>
-    <p:extLst>
-      <p:ext uri="{BB962C8B-B14F-4D97-AF65-F5344CB8AC3E}">
-        <p14:creationId xmlns:p14="http://schemas.microsoft.com/office/powerpoint/2010/main" val="1198525262"/>
-      </p:ext>
-    </p:extLst>
-  </p:cSld>
-  <p:clrMapOvr>
-    <a:masterClrMapping/>
-  </p:clrMapOvr>
-</p:notes>
-</file>
-
-<file path=ppt/notesSlides/notesSlide8.xml><?xml version="1.0" encoding="utf-8"?>
 <p:notes xmlns:a="http://schemas.openxmlformats.org/drawingml/2006/main" xmlns:r="http://schemas.openxmlformats.org/officeDocument/2006/relationships" xmlns:p="http://schemas.openxmlformats.org/presentationml/2006/main" showMasterSp="0" showMasterPhAnim="0">
   <p:cSld>
     <p:spTree>
@@ -2816,6 +2707,115 @@
     <p:extLst>
       <p:ext uri="{BB962C8B-B14F-4D97-AF65-F5344CB8AC3E}">
         <p14:creationId xmlns:p14="http://schemas.microsoft.com/office/powerpoint/2010/main" val="1091194994"/>
+      </p:ext>
+    </p:extLst>
+  </p:cSld>
+  <p:clrMapOvr>
+    <a:masterClrMapping/>
+  </p:clrMapOvr>
+</p:notes>
+</file>
+
+<file path=ppt/notesSlides/notesSlide8.xml><?xml version="1.0" encoding="utf-8"?>
+<p:notes xmlns:a="http://schemas.openxmlformats.org/drawingml/2006/main" xmlns:r="http://schemas.openxmlformats.org/officeDocument/2006/relationships" xmlns:p="http://schemas.openxmlformats.org/presentationml/2006/main" showMasterSp="0" showMasterPhAnim="0">
+  <p:cSld>
+    <p:spTree>
+      <p:nvGrpSpPr>
+        <p:cNvPr id="1" name="Shape 371"/>
+        <p:cNvGrpSpPr/>
+        <p:nvPr/>
+      </p:nvGrpSpPr>
+      <p:grpSpPr>
+        <a:xfrm>
+          <a:off x="0" y="0"/>
+          <a:ext cx="0" cy="0"/>
+          <a:chOff x="0" y="0"/>
+          <a:chExt cx="0" cy="0"/>
+        </a:xfrm>
+      </p:grpSpPr>
+      <p:sp>
+        <p:nvSpPr>
+          <p:cNvPr id="372" name="Google Shape;372;g35ed75ccf_073:notes"/>
+          <p:cNvSpPr>
+            <a:spLocks noGrp="1" noRot="1" noChangeAspect="1"/>
+          </p:cNvSpPr>
+          <p:nvPr>
+            <p:ph type="sldImg" idx="2"/>
+          </p:nvPr>
+        </p:nvSpPr>
+        <p:spPr>
+          <a:xfrm>
+            <a:off x="381000" y="685800"/>
+            <a:ext cx="6096000" cy="3429000"/>
+          </a:xfrm>
+          <a:custGeom>
+            <a:avLst/>
+            <a:gdLst/>
+            <a:ahLst/>
+            <a:cxnLst/>
+            <a:rect l="l" t="t" r="r" b="b"/>
+            <a:pathLst>
+              <a:path w="120000" h="120000" extrusionOk="0">
+                <a:moveTo>
+                  <a:pt x="0" y="0"/>
+                </a:moveTo>
+                <a:lnTo>
+                  <a:pt x="120000" y="0"/>
+                </a:lnTo>
+                <a:lnTo>
+                  <a:pt x="120000" y="120000"/>
+                </a:lnTo>
+                <a:lnTo>
+                  <a:pt x="0" y="120000"/>
+                </a:lnTo>
+                <a:close/>
+              </a:path>
+            </a:pathLst>
+          </a:custGeom>
+        </p:spPr>
+      </p:sp>
+      <p:sp>
+        <p:nvSpPr>
+          <p:cNvPr id="373" name="Google Shape;373;g35ed75ccf_073:notes"/>
+          <p:cNvSpPr txBox="1">
+            <a:spLocks noGrp="1"/>
+          </p:cNvSpPr>
+          <p:nvPr>
+            <p:ph type="body" idx="1"/>
+          </p:nvPr>
+        </p:nvSpPr>
+        <p:spPr>
+          <a:xfrm>
+            <a:off x="685800" y="4343400"/>
+            <a:ext cx="5486400" cy="4114800"/>
+          </a:xfrm>
+          <a:prstGeom prst="rect">
+            <a:avLst/>
+          </a:prstGeom>
+        </p:spPr>
+        <p:txBody>
+          <a:bodyPr spcFirstLastPara="1" wrap="square" lIns="91425" tIns="91425" rIns="91425" bIns="91425" anchor="t" anchorCtr="0">
+            <a:noAutofit/>
+          </a:bodyPr>
+          <a:lstStyle/>
+          <a:p>
+            <a:pPr marL="0" lvl="0" indent="0" algn="l" rtl="0">
+              <a:spcBef>
+                <a:spcPts val="0"/>
+              </a:spcBef>
+              <a:spcAft>
+                <a:spcPts val="0"/>
+              </a:spcAft>
+              <a:buNone/>
+            </a:pPr>
+            <a:endParaRPr/>
+          </a:p>
+        </p:txBody>
+      </p:sp>
+    </p:spTree>
+    <p:extLst>
+      <p:ext uri="{BB962C8B-B14F-4D97-AF65-F5344CB8AC3E}">
+        <p14:creationId xmlns:p14="http://schemas.microsoft.com/office/powerpoint/2010/main" val="3619177742"/>
       </p:ext>
     </p:extLst>
   </p:cSld>
@@ -2924,7 +2924,7 @@
     </p:spTree>
     <p:extLst>
       <p:ext uri="{BB962C8B-B14F-4D97-AF65-F5344CB8AC3E}">
-        <p14:creationId xmlns:p14="http://schemas.microsoft.com/office/powerpoint/2010/main" val="3619177742"/>
+        <p14:creationId xmlns:p14="http://schemas.microsoft.com/office/powerpoint/2010/main" val="3223294300"/>
       </p:ext>
     </p:extLst>
   </p:cSld>
@@ -11220,471 +11220,6 @@
       </p:sp>
       <p:sp>
         <p:nvSpPr>
-          <p:cNvPr id="7" name="Google Shape;447;p35"/>
-          <p:cNvSpPr txBox="1">
-            <a:spLocks noGrp="1"/>
-          </p:cNvSpPr>
-          <p:nvPr>
-            <p:ph type="body" idx="1"/>
-          </p:nvPr>
-        </p:nvSpPr>
-        <p:spPr>
-          <a:xfrm>
-            <a:off x="289412" y="1290650"/>
-            <a:ext cx="6167100" cy="3297900"/>
-          </a:xfrm>
-          <a:prstGeom prst="rect">
-            <a:avLst/>
-          </a:prstGeom>
-        </p:spPr>
-        <p:txBody>
-          <a:bodyPr spcFirstLastPara="1" wrap="square" lIns="0" tIns="0" rIns="0" bIns="0" anchor="t" anchorCtr="0">
-            <a:noAutofit/>
-          </a:bodyPr>
-          <a:lstStyle/>
-          <a:p>
-            <a:pPr algn="just" fontAlgn="auto"/>
-            <a:r>
-              <a:rPr lang="en-PH" dirty="0" smtClean="0"/>
-              <a:t>		</a:t>
-            </a:r>
-          </a:p>
-          <a:p>
-            <a:pPr algn="just" fontAlgn="auto"/>
-            <a:r>
-              <a:rPr lang="en-PH" dirty="0"/>
-              <a:t>	</a:t>
-            </a:r>
-            <a:r>
-              <a:rPr lang="en-PH" dirty="0" smtClean="0"/>
-              <a:t>	</a:t>
-            </a:r>
-            <a:r>
-              <a:rPr lang="en-PH" dirty="0" smtClean="0">
-                <a:solidFill>
-                  <a:schemeClr val="tx1"/>
-                </a:solidFill>
-              </a:rPr>
-              <a:t>The </a:t>
-            </a:r>
-            <a:r>
-              <a:rPr lang="en-PH" dirty="0">
-                <a:solidFill>
-                  <a:schemeClr val="tx1"/>
-                </a:solidFill>
-              </a:rPr>
-              <a:t>study to be conducted by the researchers pose </a:t>
-            </a:r>
-            <a:r>
-              <a:rPr lang="en-PH" dirty="0" smtClean="0">
-                <a:solidFill>
-                  <a:schemeClr val="tx1"/>
-                </a:solidFill>
-              </a:rPr>
-              <a:t>great significance </a:t>
-            </a:r>
-            <a:r>
-              <a:rPr lang="en-PH" dirty="0">
-                <a:solidFill>
-                  <a:schemeClr val="tx1"/>
-                </a:solidFill>
-              </a:rPr>
-              <a:t>to the transitions needed on improving the ways in which education is presented to the students. With the premise of introducing a platform in which a student can learn from an intuitive system designed for preschool to kinder learning.</a:t>
-            </a:r>
-            <a:endParaRPr lang="en-US" sz="1600" dirty="0">
-              <a:solidFill>
-                <a:schemeClr val="tx1"/>
-              </a:solidFill>
-            </a:endParaRPr>
-          </a:p>
-        </p:txBody>
-      </p:sp>
-      <p:sp>
-        <p:nvSpPr>
-          <p:cNvPr id="8" name="Rectangle 7"/>
-          <p:cNvSpPr/>
-          <p:nvPr/>
-        </p:nvSpPr>
-        <p:spPr>
-          <a:xfrm>
-            <a:off x="460862" y="285177"/>
-            <a:ext cx="1336407" cy="307777"/>
-          </a:xfrm>
-          <a:prstGeom prst="rect">
-            <a:avLst/>
-          </a:prstGeom>
-        </p:spPr>
-        <p:txBody>
-          <a:bodyPr wrap="square">
-            <a:spAutoFit/>
-          </a:bodyPr>
-          <a:lstStyle/>
-          <a:p>
-            <a:r>
-              <a:rPr lang="en" dirty="0">
-                <a:solidFill>
-                  <a:schemeClr val="accent6"/>
-                </a:solidFill>
-                <a:latin typeface="Walter Turncoat" panose="02000000000000000000" charset="0"/>
-              </a:rPr>
-              <a:t>Chapter 1</a:t>
-            </a:r>
-            <a:endParaRPr lang="en-US" dirty="0">
-              <a:latin typeface="Walter Turncoat" panose="02000000000000000000" charset="0"/>
-            </a:endParaRPr>
-          </a:p>
-        </p:txBody>
-      </p:sp>
-      <p:sp>
-        <p:nvSpPr>
-          <p:cNvPr id="9" name="Google Shape;446;p35"/>
-          <p:cNvSpPr txBox="1">
-            <a:spLocks/>
-          </p:cNvSpPr>
-          <p:nvPr/>
-        </p:nvSpPr>
-        <p:spPr>
-          <a:xfrm>
-            <a:off x="548125" y="593125"/>
-            <a:ext cx="6167100" cy="396300"/>
-          </a:xfrm>
-          <a:prstGeom prst="rect">
-            <a:avLst/>
-          </a:prstGeom>
-        </p:spPr>
-        <p:txBody>
-          <a:bodyPr spcFirstLastPara="1" wrap="square" lIns="0" tIns="0" rIns="0" bIns="0" anchor="t" anchorCtr="0">
-            <a:noAutofit/>
-          </a:bodyPr>
-          <a:lstStyle>
-            <a:defPPr marR="0" lvl="0" algn="l" rtl="0">
-              <a:lnSpc>
-                <a:spcPct val="100000"/>
-              </a:lnSpc>
-              <a:spcBef>
-                <a:spcPts val="0"/>
-              </a:spcBef>
-              <a:spcAft>
-                <a:spcPts val="0"/>
-              </a:spcAft>
-            </a:defPPr>
-            <a:lvl1pPr marR="0" lvl="0" algn="l" rtl="0">
-              <a:lnSpc>
-                <a:spcPct val="100000"/>
-              </a:lnSpc>
-              <a:spcBef>
-                <a:spcPts val="0"/>
-              </a:spcBef>
-              <a:spcAft>
-                <a:spcPts val="0"/>
-              </a:spcAft>
-              <a:buClr>
-                <a:srgbClr val="000000"/>
-              </a:buClr>
-              <a:buFont typeface="Arial"/>
-              <a:defRPr sz="1400" b="0" i="0" u="none" strike="noStrike" cap="none">
-                <a:solidFill>
-                  <a:srgbClr val="000000"/>
-                </a:solidFill>
-                <a:latin typeface="Arial"/>
-                <a:ea typeface="Arial"/>
-                <a:cs typeface="Arial"/>
-                <a:sym typeface="Arial"/>
-              </a:defRPr>
-            </a:lvl1pPr>
-            <a:lvl2pPr marR="0" lvl="1" algn="l" rtl="0">
-              <a:lnSpc>
-                <a:spcPct val="100000"/>
-              </a:lnSpc>
-              <a:spcBef>
-                <a:spcPts val="0"/>
-              </a:spcBef>
-              <a:spcAft>
-                <a:spcPts val="0"/>
-              </a:spcAft>
-              <a:buClr>
-                <a:srgbClr val="000000"/>
-              </a:buClr>
-              <a:buFont typeface="Arial"/>
-              <a:defRPr sz="1400" b="0" i="0" u="none" strike="noStrike" cap="none">
-                <a:solidFill>
-                  <a:srgbClr val="000000"/>
-                </a:solidFill>
-                <a:latin typeface="Arial"/>
-                <a:ea typeface="Arial"/>
-                <a:cs typeface="Arial"/>
-                <a:sym typeface="Arial"/>
-              </a:defRPr>
-            </a:lvl2pPr>
-            <a:lvl3pPr marR="0" lvl="2" algn="l" rtl="0">
-              <a:lnSpc>
-                <a:spcPct val="100000"/>
-              </a:lnSpc>
-              <a:spcBef>
-                <a:spcPts val="0"/>
-              </a:spcBef>
-              <a:spcAft>
-                <a:spcPts val="0"/>
-              </a:spcAft>
-              <a:buClr>
-                <a:srgbClr val="000000"/>
-              </a:buClr>
-              <a:buFont typeface="Arial"/>
-              <a:defRPr sz="1400" b="0" i="0" u="none" strike="noStrike" cap="none">
-                <a:solidFill>
-                  <a:srgbClr val="000000"/>
-                </a:solidFill>
-                <a:latin typeface="Arial"/>
-                <a:ea typeface="Arial"/>
-                <a:cs typeface="Arial"/>
-                <a:sym typeface="Arial"/>
-              </a:defRPr>
-            </a:lvl3pPr>
-            <a:lvl4pPr marR="0" lvl="3" algn="l" rtl="0">
-              <a:lnSpc>
-                <a:spcPct val="100000"/>
-              </a:lnSpc>
-              <a:spcBef>
-                <a:spcPts val="0"/>
-              </a:spcBef>
-              <a:spcAft>
-                <a:spcPts val="0"/>
-              </a:spcAft>
-              <a:buClr>
-                <a:srgbClr val="000000"/>
-              </a:buClr>
-              <a:buFont typeface="Arial"/>
-              <a:defRPr sz="1400" b="0" i="0" u="none" strike="noStrike" cap="none">
-                <a:solidFill>
-                  <a:srgbClr val="000000"/>
-                </a:solidFill>
-                <a:latin typeface="Arial"/>
-                <a:ea typeface="Arial"/>
-                <a:cs typeface="Arial"/>
-                <a:sym typeface="Arial"/>
-              </a:defRPr>
-            </a:lvl4pPr>
-            <a:lvl5pPr marR="0" lvl="4" algn="l" rtl="0">
-              <a:lnSpc>
-                <a:spcPct val="100000"/>
-              </a:lnSpc>
-              <a:spcBef>
-                <a:spcPts val="0"/>
-              </a:spcBef>
-              <a:spcAft>
-                <a:spcPts val="0"/>
-              </a:spcAft>
-              <a:buClr>
-                <a:srgbClr val="000000"/>
-              </a:buClr>
-              <a:buFont typeface="Arial"/>
-              <a:defRPr sz="1400" b="0" i="0" u="none" strike="noStrike" cap="none">
-                <a:solidFill>
-                  <a:srgbClr val="000000"/>
-                </a:solidFill>
-                <a:latin typeface="Arial"/>
-                <a:ea typeface="Arial"/>
-                <a:cs typeface="Arial"/>
-                <a:sym typeface="Arial"/>
-              </a:defRPr>
-            </a:lvl5pPr>
-            <a:lvl6pPr marR="0" lvl="5" algn="l" rtl="0">
-              <a:lnSpc>
-                <a:spcPct val="100000"/>
-              </a:lnSpc>
-              <a:spcBef>
-                <a:spcPts val="0"/>
-              </a:spcBef>
-              <a:spcAft>
-                <a:spcPts val="0"/>
-              </a:spcAft>
-              <a:buClr>
-                <a:srgbClr val="000000"/>
-              </a:buClr>
-              <a:buFont typeface="Arial"/>
-              <a:defRPr sz="1400" b="0" i="0" u="none" strike="noStrike" cap="none">
-                <a:solidFill>
-                  <a:srgbClr val="000000"/>
-                </a:solidFill>
-                <a:latin typeface="Arial"/>
-                <a:ea typeface="Arial"/>
-                <a:cs typeface="Arial"/>
-                <a:sym typeface="Arial"/>
-              </a:defRPr>
-            </a:lvl6pPr>
-            <a:lvl7pPr marR="0" lvl="6" algn="l" rtl="0">
-              <a:lnSpc>
-                <a:spcPct val="100000"/>
-              </a:lnSpc>
-              <a:spcBef>
-                <a:spcPts val="0"/>
-              </a:spcBef>
-              <a:spcAft>
-                <a:spcPts val="0"/>
-              </a:spcAft>
-              <a:buClr>
-                <a:srgbClr val="000000"/>
-              </a:buClr>
-              <a:buFont typeface="Arial"/>
-              <a:defRPr sz="1400" b="0" i="0" u="none" strike="noStrike" cap="none">
-                <a:solidFill>
-                  <a:srgbClr val="000000"/>
-                </a:solidFill>
-                <a:latin typeface="Arial"/>
-                <a:ea typeface="Arial"/>
-                <a:cs typeface="Arial"/>
-                <a:sym typeface="Arial"/>
-              </a:defRPr>
-            </a:lvl7pPr>
-            <a:lvl8pPr marR="0" lvl="7" algn="l" rtl="0">
-              <a:lnSpc>
-                <a:spcPct val="100000"/>
-              </a:lnSpc>
-              <a:spcBef>
-                <a:spcPts val="0"/>
-              </a:spcBef>
-              <a:spcAft>
-                <a:spcPts val="0"/>
-              </a:spcAft>
-              <a:buClr>
-                <a:srgbClr val="000000"/>
-              </a:buClr>
-              <a:buFont typeface="Arial"/>
-              <a:defRPr sz="1400" b="0" i="0" u="none" strike="noStrike" cap="none">
-                <a:solidFill>
-                  <a:srgbClr val="000000"/>
-                </a:solidFill>
-                <a:latin typeface="Arial"/>
-                <a:ea typeface="Arial"/>
-                <a:cs typeface="Arial"/>
-                <a:sym typeface="Arial"/>
-              </a:defRPr>
-            </a:lvl8pPr>
-            <a:lvl9pPr marR="0" lvl="8" algn="l" rtl="0">
-              <a:lnSpc>
-                <a:spcPct val="100000"/>
-              </a:lnSpc>
-              <a:spcBef>
-                <a:spcPts val="0"/>
-              </a:spcBef>
-              <a:spcAft>
-                <a:spcPts val="0"/>
-              </a:spcAft>
-              <a:buClr>
-                <a:srgbClr val="000000"/>
-              </a:buClr>
-              <a:buFont typeface="Arial"/>
-              <a:defRPr sz="1400" b="0" i="0" u="none" strike="noStrike" cap="none">
-                <a:solidFill>
-                  <a:srgbClr val="000000"/>
-                </a:solidFill>
-                <a:latin typeface="Arial"/>
-                <a:ea typeface="Arial"/>
-                <a:cs typeface="Arial"/>
-                <a:sym typeface="Arial"/>
-              </a:defRPr>
-            </a:lvl9pPr>
-          </a:lstStyle>
-          <a:p>
-            <a:r>
-              <a:rPr lang="en-US" sz="3000" dirty="0" smtClean="0">
-                <a:solidFill>
-                  <a:schemeClr val="tx1"/>
-                </a:solidFill>
-                <a:latin typeface="Walter Turncoat" panose="02000000000000000000" charset="0"/>
-              </a:rPr>
-              <a:t>Significance of the study</a:t>
-            </a:r>
-            <a:endParaRPr lang="en-US" sz="3000" dirty="0">
-              <a:solidFill>
-                <a:schemeClr val="tx1"/>
-              </a:solidFill>
-              <a:latin typeface="Walter Turncoat" panose="02000000000000000000" charset="0"/>
-            </a:endParaRPr>
-          </a:p>
-        </p:txBody>
-      </p:sp>
-    </p:spTree>
-    <p:extLst>
-      <p:ext uri="{BB962C8B-B14F-4D97-AF65-F5344CB8AC3E}">
-        <p14:creationId xmlns:p14="http://schemas.microsoft.com/office/powerpoint/2010/main" val="640416534"/>
-      </p:ext>
-    </p:extLst>
-  </p:cSld>
-  <p:clrMapOvr>
-    <a:masterClrMapping/>
-  </p:clrMapOvr>
-  <p:timing>
-    <p:tnLst>
-      <p:par>
-        <p:cTn id="1" dur="indefinite" restart="never" nodeType="tmRoot"/>
-      </p:par>
-    </p:tnLst>
-  </p:timing>
-</p:sld>
-</file>
-
-<file path=ppt/slides/slide11.xml><?xml version="1.0" encoding="utf-8"?>
-<p:sld xmlns:a="http://schemas.openxmlformats.org/drawingml/2006/main" xmlns:r="http://schemas.openxmlformats.org/officeDocument/2006/relationships" xmlns:p="http://schemas.openxmlformats.org/presentationml/2006/main">
-  <p:cSld>
-    <p:spTree>
-      <p:nvGrpSpPr>
-        <p:cNvPr id="1" name="Shape 374"/>
-        <p:cNvGrpSpPr/>
-        <p:nvPr/>
-      </p:nvGrpSpPr>
-      <p:grpSpPr>
-        <a:xfrm>
-          <a:off x="0" y="0"/>
-          <a:ext cx="0" cy="0"/>
-          <a:chOff x="0" y="0"/>
-          <a:chExt cx="0" cy="0"/>
-        </a:xfrm>
-      </p:grpSpPr>
-      <p:sp>
-        <p:nvSpPr>
-          <p:cNvPr id="376" name="Google Shape;376;p30"/>
-          <p:cNvSpPr txBox="1">
-            <a:spLocks noGrp="1"/>
-          </p:cNvSpPr>
-          <p:nvPr>
-            <p:ph type="sldNum" idx="12"/>
-          </p:nvPr>
-        </p:nvSpPr>
-        <p:spPr>
-          <a:xfrm>
-            <a:off x="8404384" y="199526"/>
-            <a:ext cx="548700" cy="393600"/>
-          </a:xfrm>
-          <a:prstGeom prst="rect">
-            <a:avLst/>
-          </a:prstGeom>
-        </p:spPr>
-        <p:txBody>
-          <a:bodyPr spcFirstLastPara="1" wrap="square" lIns="0" tIns="0" rIns="0" bIns="0" anchor="t" anchorCtr="0">
-            <a:noAutofit/>
-          </a:bodyPr>
-          <a:lstStyle/>
-          <a:p>
-            <a:pPr marL="0" lvl="0" indent="0" algn="r" rtl="0">
-              <a:spcBef>
-                <a:spcPts val="0"/>
-              </a:spcBef>
-              <a:spcAft>
-                <a:spcPts val="0"/>
-              </a:spcAft>
-              <a:buNone/>
-            </a:pPr>
-            <a:fld id="{00000000-1234-1234-1234-123412341234}" type="slidenum">
-              <a:rPr lang="en"/>
-              <a:t>11</a:t>
-            </a:fld>
-            <a:endParaRPr/>
-          </a:p>
-        </p:txBody>
-      </p:sp>
-      <p:sp>
-        <p:nvSpPr>
           <p:cNvPr id="8" name="Rectangle 7"/>
           <p:cNvSpPr/>
           <p:nvPr/>
@@ -21417,7 +20952,7 @@
 </p:sld>
 </file>
 
-<file path=ppt/slides/slide12.xml><?xml version="1.0" encoding="utf-8"?>
+<file path=ppt/slides/slide11.xml><?xml version="1.0" encoding="utf-8"?>
 <p:sld xmlns:a="http://schemas.openxmlformats.org/drawingml/2006/main" xmlns:r="http://schemas.openxmlformats.org/officeDocument/2006/relationships" xmlns:p="http://schemas.openxmlformats.org/presentationml/2006/main">
   <p:cSld>
     <p:spTree>
@@ -21470,7 +21005,7 @@
             </a:pPr>
             <a:fld id="{00000000-1234-1234-1234-123412341234}" type="slidenum">
               <a:rPr lang="en"/>
-              <a:t>12</a:t>
+              <a:t>11</a:t>
             </a:fld>
             <a:endParaRPr/>
           </a:p>
@@ -27851,7 +27386,7 @@
 </p:sld>
 </file>
 
-<file path=ppt/slides/slide13.xml><?xml version="1.0" encoding="utf-8"?>
+<file path=ppt/slides/slide12.xml><?xml version="1.0" encoding="utf-8"?>
 <p:sld xmlns:a="http://schemas.openxmlformats.org/drawingml/2006/main" xmlns:r="http://schemas.openxmlformats.org/officeDocument/2006/relationships" xmlns:p="http://schemas.openxmlformats.org/presentationml/2006/main">
   <p:cSld>
     <p:spTree>
@@ -28052,7 +27587,7 @@
             </a:pPr>
             <a:fld id="{00000000-1234-1234-1234-123412341234}" type="slidenum">
               <a:rPr lang="en"/>
-              <a:t>13</a:t>
+              <a:t>12</a:t>
             </a:fld>
             <a:endParaRPr/>
           </a:p>
@@ -28518,7 +28053,7 @@
 </p:sld>
 </file>
 
-<file path=ppt/slides/slide14.xml><?xml version="1.0" encoding="utf-8"?>
+<file path=ppt/slides/slide13.xml><?xml version="1.0" encoding="utf-8"?>
 <p:sld xmlns:a="http://schemas.openxmlformats.org/drawingml/2006/main" xmlns:r="http://schemas.openxmlformats.org/officeDocument/2006/relationships" xmlns:p="http://schemas.openxmlformats.org/presentationml/2006/main">
   <p:cSld>
     <p:spTree>
@@ -28628,7 +28163,7 @@
 </p:sld>
 </file>
 
-<file path=ppt/slides/slide15.xml><?xml version="1.0" encoding="utf-8"?>
+<file path=ppt/slides/slide14.xml><?xml version="1.0" encoding="utf-8"?>
 <p:sld xmlns:a="http://schemas.openxmlformats.org/drawingml/2006/main" xmlns:r="http://schemas.openxmlformats.org/officeDocument/2006/relationships" xmlns:p="http://schemas.openxmlformats.org/presentationml/2006/main">
   <p:cSld>
     <p:spTree>
@@ -28822,7 +28357,7 @@
             </a:pPr>
             <a:fld id="{00000000-1234-1234-1234-123412341234}" type="slidenum">
               <a:rPr lang="en"/>
-              <a:t>15</a:t>
+              <a:t>14</a:t>
             </a:fld>
             <a:endParaRPr/>
           </a:p>
@@ -28884,7 +28419,7 @@
 </p:sld>
 </file>
 
-<file path=ppt/slides/slide16.xml><?xml version="1.0" encoding="utf-8"?>
+<file path=ppt/slides/slide15.xml><?xml version="1.0" encoding="utf-8"?>
 <p:sld xmlns:a="http://schemas.openxmlformats.org/drawingml/2006/main" xmlns:r="http://schemas.openxmlformats.org/officeDocument/2006/relationships" xmlns:p="http://schemas.openxmlformats.org/presentationml/2006/main">
   <p:cSld>
     <p:spTree>
@@ -28994,7 +28529,7 @@
 </p:sld>
 </file>
 
-<file path=ppt/slides/slide17.xml><?xml version="1.0" encoding="utf-8"?>
+<file path=ppt/slides/slide16.xml><?xml version="1.0" encoding="utf-8"?>
 <p:sld xmlns:a="http://schemas.openxmlformats.org/drawingml/2006/main" xmlns:r="http://schemas.openxmlformats.org/officeDocument/2006/relationships" xmlns:p="http://schemas.openxmlformats.org/presentationml/2006/main">
   <p:cSld>
     <p:spTree>
@@ -29047,7 +28582,7 @@
             </a:pPr>
             <a:fld id="{00000000-1234-1234-1234-123412341234}" type="slidenum">
               <a:rPr lang="en"/>
-              <a:t>17</a:t>
+              <a:t>16</a:t>
             </a:fld>
             <a:endParaRPr/>
           </a:p>
@@ -29256,6 +28791,444 @@
 </p:sld>
 </file>
 
+<file path=ppt/slides/slide17.xml><?xml version="1.0" encoding="utf-8"?>
+<p:sld xmlns:a="http://schemas.openxmlformats.org/drawingml/2006/main" xmlns:r="http://schemas.openxmlformats.org/officeDocument/2006/relationships" xmlns:p="http://schemas.openxmlformats.org/presentationml/2006/main">
+  <p:cSld>
+    <p:spTree>
+      <p:nvGrpSpPr>
+        <p:cNvPr id="1" name="Shape 374"/>
+        <p:cNvGrpSpPr/>
+        <p:nvPr/>
+      </p:nvGrpSpPr>
+      <p:grpSpPr>
+        <a:xfrm>
+          <a:off x="0" y="0"/>
+          <a:ext cx="0" cy="0"/>
+          <a:chOff x="0" y="0"/>
+          <a:chExt cx="0" cy="0"/>
+        </a:xfrm>
+      </p:grpSpPr>
+      <p:sp>
+        <p:nvSpPr>
+          <p:cNvPr id="376" name="Google Shape;376;p30"/>
+          <p:cNvSpPr txBox="1">
+            <a:spLocks noGrp="1"/>
+          </p:cNvSpPr>
+          <p:nvPr>
+            <p:ph type="sldNum" idx="12"/>
+          </p:nvPr>
+        </p:nvSpPr>
+        <p:spPr>
+          <a:xfrm>
+            <a:off x="8404384" y="199526"/>
+            <a:ext cx="548700" cy="393600"/>
+          </a:xfrm>
+          <a:prstGeom prst="rect">
+            <a:avLst/>
+          </a:prstGeom>
+        </p:spPr>
+        <p:txBody>
+          <a:bodyPr spcFirstLastPara="1" wrap="square" lIns="0" tIns="0" rIns="0" bIns="0" anchor="t" anchorCtr="0">
+            <a:noAutofit/>
+          </a:bodyPr>
+          <a:lstStyle/>
+          <a:p>
+            <a:pPr marL="0" lvl="0" indent="0" algn="r" rtl="0">
+              <a:spcBef>
+                <a:spcPts val="0"/>
+              </a:spcBef>
+              <a:spcAft>
+                <a:spcPts val="0"/>
+              </a:spcAft>
+              <a:buNone/>
+            </a:pPr>
+            <a:fld id="{00000000-1234-1234-1234-123412341234}" type="slidenum">
+              <a:rPr lang="en"/>
+              <a:t>17</a:t>
+            </a:fld>
+            <a:endParaRPr/>
+          </a:p>
+        </p:txBody>
+      </p:sp>
+      <p:sp>
+        <p:nvSpPr>
+          <p:cNvPr id="8" name="Rectangle 7"/>
+          <p:cNvSpPr/>
+          <p:nvPr/>
+        </p:nvSpPr>
+        <p:spPr>
+          <a:xfrm>
+            <a:off x="460862" y="285177"/>
+            <a:ext cx="1336407" cy="307777"/>
+          </a:xfrm>
+          <a:prstGeom prst="rect">
+            <a:avLst/>
+          </a:prstGeom>
+        </p:spPr>
+        <p:txBody>
+          <a:bodyPr wrap="square">
+            <a:spAutoFit/>
+          </a:bodyPr>
+          <a:lstStyle/>
+          <a:p>
+            <a:r>
+              <a:rPr lang="en" dirty="0">
+                <a:solidFill>
+                  <a:schemeClr val="accent6"/>
+                </a:solidFill>
+                <a:latin typeface="Walter Turncoat" panose="02000000000000000000" charset="0"/>
+              </a:rPr>
+              <a:t>Chapter </a:t>
+            </a:r>
+            <a:r>
+              <a:rPr lang="en" dirty="0" smtClean="0">
+                <a:solidFill>
+                  <a:schemeClr val="accent6"/>
+                </a:solidFill>
+                <a:latin typeface="Walter Turncoat" panose="02000000000000000000" charset="0"/>
+              </a:rPr>
+              <a:t>3</a:t>
+            </a:r>
+            <a:endParaRPr lang="en-US" dirty="0">
+              <a:latin typeface="Walter Turncoat" panose="02000000000000000000" charset="0"/>
+            </a:endParaRPr>
+          </a:p>
+        </p:txBody>
+      </p:sp>
+      <p:sp>
+        <p:nvSpPr>
+          <p:cNvPr id="9" name="Google Shape;446;p35"/>
+          <p:cNvSpPr txBox="1">
+            <a:spLocks/>
+          </p:cNvSpPr>
+          <p:nvPr/>
+        </p:nvSpPr>
+        <p:spPr>
+          <a:xfrm>
+            <a:off x="548125" y="593125"/>
+            <a:ext cx="6167100" cy="396300"/>
+          </a:xfrm>
+          <a:prstGeom prst="rect">
+            <a:avLst/>
+          </a:prstGeom>
+        </p:spPr>
+        <p:txBody>
+          <a:bodyPr spcFirstLastPara="1" wrap="square" lIns="0" tIns="0" rIns="0" bIns="0" anchor="t" anchorCtr="0">
+            <a:noAutofit/>
+          </a:bodyPr>
+          <a:lstStyle>
+            <a:defPPr marR="0" lvl="0" algn="l" rtl="0">
+              <a:lnSpc>
+                <a:spcPct val="100000"/>
+              </a:lnSpc>
+              <a:spcBef>
+                <a:spcPts val="0"/>
+              </a:spcBef>
+              <a:spcAft>
+                <a:spcPts val="0"/>
+              </a:spcAft>
+            </a:defPPr>
+            <a:lvl1pPr marR="0" lvl="0" algn="l" rtl="0">
+              <a:lnSpc>
+                <a:spcPct val="100000"/>
+              </a:lnSpc>
+              <a:spcBef>
+                <a:spcPts val="0"/>
+              </a:spcBef>
+              <a:spcAft>
+                <a:spcPts val="0"/>
+              </a:spcAft>
+              <a:buClr>
+                <a:srgbClr val="000000"/>
+              </a:buClr>
+              <a:buFont typeface="Arial"/>
+              <a:defRPr sz="1400" b="0" i="0" u="none" strike="noStrike" cap="none">
+                <a:solidFill>
+                  <a:srgbClr val="000000"/>
+                </a:solidFill>
+                <a:latin typeface="Arial"/>
+                <a:ea typeface="Arial"/>
+                <a:cs typeface="Arial"/>
+                <a:sym typeface="Arial"/>
+              </a:defRPr>
+            </a:lvl1pPr>
+            <a:lvl2pPr marR="0" lvl="1" algn="l" rtl="0">
+              <a:lnSpc>
+                <a:spcPct val="100000"/>
+              </a:lnSpc>
+              <a:spcBef>
+                <a:spcPts val="0"/>
+              </a:spcBef>
+              <a:spcAft>
+                <a:spcPts val="0"/>
+              </a:spcAft>
+              <a:buClr>
+                <a:srgbClr val="000000"/>
+              </a:buClr>
+              <a:buFont typeface="Arial"/>
+              <a:defRPr sz="1400" b="0" i="0" u="none" strike="noStrike" cap="none">
+                <a:solidFill>
+                  <a:srgbClr val="000000"/>
+                </a:solidFill>
+                <a:latin typeface="Arial"/>
+                <a:ea typeface="Arial"/>
+                <a:cs typeface="Arial"/>
+                <a:sym typeface="Arial"/>
+              </a:defRPr>
+            </a:lvl2pPr>
+            <a:lvl3pPr marR="0" lvl="2" algn="l" rtl="0">
+              <a:lnSpc>
+                <a:spcPct val="100000"/>
+              </a:lnSpc>
+              <a:spcBef>
+                <a:spcPts val="0"/>
+              </a:spcBef>
+              <a:spcAft>
+                <a:spcPts val="0"/>
+              </a:spcAft>
+              <a:buClr>
+                <a:srgbClr val="000000"/>
+              </a:buClr>
+              <a:buFont typeface="Arial"/>
+              <a:defRPr sz="1400" b="0" i="0" u="none" strike="noStrike" cap="none">
+                <a:solidFill>
+                  <a:srgbClr val="000000"/>
+                </a:solidFill>
+                <a:latin typeface="Arial"/>
+                <a:ea typeface="Arial"/>
+                <a:cs typeface="Arial"/>
+                <a:sym typeface="Arial"/>
+              </a:defRPr>
+            </a:lvl3pPr>
+            <a:lvl4pPr marR="0" lvl="3" algn="l" rtl="0">
+              <a:lnSpc>
+                <a:spcPct val="100000"/>
+              </a:lnSpc>
+              <a:spcBef>
+                <a:spcPts val="0"/>
+              </a:spcBef>
+              <a:spcAft>
+                <a:spcPts val="0"/>
+              </a:spcAft>
+              <a:buClr>
+                <a:srgbClr val="000000"/>
+              </a:buClr>
+              <a:buFont typeface="Arial"/>
+              <a:defRPr sz="1400" b="0" i="0" u="none" strike="noStrike" cap="none">
+                <a:solidFill>
+                  <a:srgbClr val="000000"/>
+                </a:solidFill>
+                <a:latin typeface="Arial"/>
+                <a:ea typeface="Arial"/>
+                <a:cs typeface="Arial"/>
+                <a:sym typeface="Arial"/>
+              </a:defRPr>
+            </a:lvl4pPr>
+            <a:lvl5pPr marR="0" lvl="4" algn="l" rtl="0">
+              <a:lnSpc>
+                <a:spcPct val="100000"/>
+              </a:lnSpc>
+              <a:spcBef>
+                <a:spcPts val="0"/>
+              </a:spcBef>
+              <a:spcAft>
+                <a:spcPts val="0"/>
+              </a:spcAft>
+              <a:buClr>
+                <a:srgbClr val="000000"/>
+              </a:buClr>
+              <a:buFont typeface="Arial"/>
+              <a:defRPr sz="1400" b="0" i="0" u="none" strike="noStrike" cap="none">
+                <a:solidFill>
+                  <a:srgbClr val="000000"/>
+                </a:solidFill>
+                <a:latin typeface="Arial"/>
+                <a:ea typeface="Arial"/>
+                <a:cs typeface="Arial"/>
+                <a:sym typeface="Arial"/>
+              </a:defRPr>
+            </a:lvl5pPr>
+            <a:lvl6pPr marR="0" lvl="5" algn="l" rtl="0">
+              <a:lnSpc>
+                <a:spcPct val="100000"/>
+              </a:lnSpc>
+              <a:spcBef>
+                <a:spcPts val="0"/>
+              </a:spcBef>
+              <a:spcAft>
+                <a:spcPts val="0"/>
+              </a:spcAft>
+              <a:buClr>
+                <a:srgbClr val="000000"/>
+              </a:buClr>
+              <a:buFont typeface="Arial"/>
+              <a:defRPr sz="1400" b="0" i="0" u="none" strike="noStrike" cap="none">
+                <a:solidFill>
+                  <a:srgbClr val="000000"/>
+                </a:solidFill>
+                <a:latin typeface="Arial"/>
+                <a:ea typeface="Arial"/>
+                <a:cs typeface="Arial"/>
+                <a:sym typeface="Arial"/>
+              </a:defRPr>
+            </a:lvl6pPr>
+            <a:lvl7pPr marR="0" lvl="6" algn="l" rtl="0">
+              <a:lnSpc>
+                <a:spcPct val="100000"/>
+              </a:lnSpc>
+              <a:spcBef>
+                <a:spcPts val="0"/>
+              </a:spcBef>
+              <a:spcAft>
+                <a:spcPts val="0"/>
+              </a:spcAft>
+              <a:buClr>
+                <a:srgbClr val="000000"/>
+              </a:buClr>
+              <a:buFont typeface="Arial"/>
+              <a:defRPr sz="1400" b="0" i="0" u="none" strike="noStrike" cap="none">
+                <a:solidFill>
+                  <a:srgbClr val="000000"/>
+                </a:solidFill>
+                <a:latin typeface="Arial"/>
+                <a:ea typeface="Arial"/>
+                <a:cs typeface="Arial"/>
+                <a:sym typeface="Arial"/>
+              </a:defRPr>
+            </a:lvl7pPr>
+            <a:lvl8pPr marR="0" lvl="7" algn="l" rtl="0">
+              <a:lnSpc>
+                <a:spcPct val="100000"/>
+              </a:lnSpc>
+              <a:spcBef>
+                <a:spcPts val="0"/>
+              </a:spcBef>
+              <a:spcAft>
+                <a:spcPts val="0"/>
+              </a:spcAft>
+              <a:buClr>
+                <a:srgbClr val="000000"/>
+              </a:buClr>
+              <a:buFont typeface="Arial"/>
+              <a:defRPr sz="1400" b="0" i="0" u="none" strike="noStrike" cap="none">
+                <a:solidFill>
+                  <a:srgbClr val="000000"/>
+                </a:solidFill>
+                <a:latin typeface="Arial"/>
+                <a:ea typeface="Arial"/>
+                <a:cs typeface="Arial"/>
+                <a:sym typeface="Arial"/>
+              </a:defRPr>
+            </a:lvl8pPr>
+            <a:lvl9pPr marR="0" lvl="8" algn="l" rtl="0">
+              <a:lnSpc>
+                <a:spcPct val="100000"/>
+              </a:lnSpc>
+              <a:spcBef>
+                <a:spcPts val="0"/>
+              </a:spcBef>
+              <a:spcAft>
+                <a:spcPts val="0"/>
+              </a:spcAft>
+              <a:buClr>
+                <a:srgbClr val="000000"/>
+              </a:buClr>
+              <a:buFont typeface="Arial"/>
+              <a:defRPr sz="1400" b="0" i="0" u="none" strike="noStrike" cap="none">
+                <a:solidFill>
+                  <a:srgbClr val="000000"/>
+                </a:solidFill>
+                <a:latin typeface="Arial"/>
+                <a:ea typeface="Arial"/>
+                <a:cs typeface="Arial"/>
+                <a:sym typeface="Arial"/>
+              </a:defRPr>
+            </a:lvl9pPr>
+          </a:lstStyle>
+          <a:p>
+            <a:pPr algn="ctr"/>
+            <a:r>
+              <a:rPr lang="en-US" sz="3000" dirty="0" smtClean="0">
+                <a:solidFill>
+                  <a:schemeClr val="tx1"/>
+                </a:solidFill>
+                <a:latin typeface="Walter Turncoat" panose="02000000000000000000" charset="0"/>
+              </a:rPr>
+              <a:t>Respondents of the study</a:t>
+            </a:r>
+            <a:endParaRPr lang="en-US" sz="3000" dirty="0">
+              <a:solidFill>
+                <a:schemeClr val="tx1"/>
+              </a:solidFill>
+              <a:latin typeface="Walter Turncoat" panose="02000000000000000000" charset="0"/>
+            </a:endParaRPr>
+          </a:p>
+        </p:txBody>
+      </p:sp>
+      <p:sp>
+        <p:nvSpPr>
+          <p:cNvPr id="16" name="Google Shape;370;p29"/>
+          <p:cNvSpPr txBox="1">
+            <a:spLocks noGrp="1"/>
+          </p:cNvSpPr>
+          <p:nvPr>
+            <p:ph type="body" idx="4294967295"/>
+          </p:nvPr>
+        </p:nvSpPr>
+        <p:spPr>
+          <a:xfrm>
+            <a:off x="756745" y="1402824"/>
+            <a:ext cx="5749158" cy="2927437"/>
+          </a:xfrm>
+          <a:prstGeom prst="rect">
+            <a:avLst/>
+          </a:prstGeom>
+        </p:spPr>
+        <p:txBody>
+          <a:bodyPr spcFirstLastPara="1" wrap="square" lIns="0" tIns="0" rIns="0" bIns="0" anchor="t" anchorCtr="0">
+            <a:noAutofit/>
+          </a:bodyPr>
+          <a:lstStyle/>
+          <a:p>
+            <a:pPr marL="0" lvl="0" indent="0" algn="just">
+              <a:buNone/>
+            </a:pPr>
+            <a:r>
+              <a:rPr lang="en-PH" dirty="0">
+                <a:solidFill>
+                  <a:schemeClr val="tx1"/>
+                </a:solidFill>
+              </a:rPr>
+              <a:t>To gather the necessary data, the researchers will use a non-probability sampling technique. Purposive sampling is a sampling method which enables the researchers to choose their own sample from a population.</a:t>
+            </a:r>
+            <a:endParaRPr sz="1200" dirty="0">
+              <a:solidFill>
+                <a:schemeClr val="tx1"/>
+              </a:solidFill>
+            </a:endParaRPr>
+          </a:p>
+        </p:txBody>
+      </p:sp>
+    </p:spTree>
+    <p:extLst>
+      <p:ext uri="{BB962C8B-B14F-4D97-AF65-F5344CB8AC3E}">
+        <p14:creationId xmlns:p14="http://schemas.microsoft.com/office/powerpoint/2010/main" val="2505413762"/>
+      </p:ext>
+    </p:extLst>
+  </p:cSld>
+  <p:clrMapOvr>
+    <a:masterClrMapping/>
+  </p:clrMapOvr>
+  <p:timing>
+    <p:tnLst>
+      <p:par>
+        <p:cTn id="1" dur="indefinite" restart="never" nodeType="tmRoot"/>
+      </p:par>
+    </p:tnLst>
+  </p:timing>
+</p:sld>
+</file>
+
 <file path=ppt/slides/slide18.xml><?xml version="1.0" encoding="utf-8"?>
 <p:sld xmlns:a="http://schemas.openxmlformats.org/drawingml/2006/main" xmlns:r="http://schemas.openxmlformats.org/officeDocument/2006/relationships" xmlns:p="http://schemas.openxmlformats.org/presentationml/2006/main">
   <p:cSld>
@@ -29758,7 +29731,7 @@
         </p:nvSpPr>
         <p:spPr>
           <a:xfrm>
-            <a:off x="1639725" y="1389290"/>
+            <a:off x="1317157" y="1360784"/>
             <a:ext cx="1921200" cy="1499400"/>
           </a:xfrm>
           <a:prstGeom prst="rect">
@@ -29787,7 +29760,7 @@
                 </a:solidFill>
                 <a:latin typeface="Nunito" panose="020B0604020202020204" charset="0"/>
               </a:rPr>
-              <a:t>Guardian</a:t>
+              <a:t>Parents/Guardian</a:t>
             </a:r>
             <a:endParaRPr sz="1800" b="1" dirty="0">
               <a:solidFill>
@@ -44467,26 +44440,107 @@
               <a:buSzPts val="2400"/>
             </a:pPr>
             <a:r>
+              <a:rPr lang="en-US" dirty="0">
+                <a:solidFill>
+                  <a:schemeClr val="tx1"/>
+                </a:solidFill>
+              </a:rPr>
+              <a:t>Preschool </a:t>
+            </a:r>
+            <a:r>
+              <a:rPr lang="en-US" dirty="0" smtClean="0">
+                <a:solidFill>
+                  <a:schemeClr val="tx1"/>
+                </a:solidFill>
+              </a:rPr>
+              <a:t>is a necessary step for </a:t>
+            </a:r>
+            <a:r>
+              <a:rPr lang="en-US" dirty="0">
+                <a:solidFill>
+                  <a:schemeClr val="tx1"/>
+                </a:solidFill>
+              </a:rPr>
+              <a:t>preparing </a:t>
+            </a:r>
+            <a:r>
+              <a:rPr lang="en-US" dirty="0" smtClean="0">
+                <a:solidFill>
+                  <a:schemeClr val="tx1"/>
+                </a:solidFill>
+              </a:rPr>
+              <a:t>toddlers for higher education.</a:t>
+            </a:r>
+          </a:p>
+          <a:p>
+            <a:pPr lvl="0" indent="-381000">
+              <a:spcBef>
+                <a:spcPts val="800"/>
+              </a:spcBef>
+              <a:buClr>
+                <a:schemeClr val="accent4"/>
+              </a:buClr>
+              <a:buSzPts val="2400"/>
+            </a:pPr>
+            <a:r>
+              <a:rPr lang="en-US" dirty="0">
+                <a:solidFill>
+                  <a:schemeClr val="tx1"/>
+                </a:solidFill>
+              </a:rPr>
+              <a:t>Due to pandemic, there is an abrupt shift from physical to digital learning</a:t>
+            </a:r>
+            <a:r>
+              <a:rPr lang="en-US" dirty="0" smtClean="0">
+                <a:solidFill>
+                  <a:schemeClr val="tx1"/>
+                </a:solidFill>
+              </a:rPr>
+              <a:t>.</a:t>
+            </a:r>
+          </a:p>
+          <a:p>
+            <a:pPr lvl="0" indent="-381000">
+              <a:spcBef>
+                <a:spcPts val="800"/>
+              </a:spcBef>
+              <a:buClr>
+                <a:schemeClr val="accent4"/>
+              </a:buClr>
+              <a:buSzPts val="2400"/>
+            </a:pPr>
+            <a:r>
               <a:rPr lang="en-PH" dirty="0" smtClean="0">
                 <a:solidFill>
                   <a:schemeClr val="tx1"/>
                 </a:solidFill>
               </a:rPr>
-              <a:t>Businesses </a:t>
+              <a:t>To develop a system using CAI with Adaptive Learning to provide aid to Preschool education.</a:t>
             </a:r>
-            <a:r>
-              <a:rPr lang="en-PH" dirty="0">
-                <a:solidFill>
-                  <a:schemeClr val="tx1"/>
-                </a:solidFill>
-              </a:rPr>
-              <a:t>are advertising across the internet, and communication has been enhanced dramatically because of social media, a new platform for entertainment and so much more.</a:t>
-            </a:r>
-            <a:endParaRPr sz="2400" dirty="0">
-              <a:solidFill>
-                <a:schemeClr val="tx1"/>
-              </a:solidFill>
-            </a:endParaRPr>
+          </a:p>
+          <a:p>
+            <a:pPr lvl="0" indent="-381000">
+              <a:spcBef>
+                <a:spcPts val="800"/>
+              </a:spcBef>
+              <a:buClr>
+                <a:schemeClr val="accent4"/>
+              </a:buClr>
+              <a:buSzPts val="2400"/>
+            </a:pPr>
+            <a:endParaRPr lang="en-PH" dirty="0" smtClean="0"/>
+          </a:p>
+          <a:p>
+            <a:pPr lvl="0" indent="-381000">
+              <a:spcBef>
+                <a:spcPts val="800"/>
+              </a:spcBef>
+              <a:buClr>
+                <a:schemeClr val="accent4"/>
+              </a:buClr>
+              <a:buSzPts val="2400"/>
+            </a:pPr>
+            <a:endParaRPr lang="en-PH" dirty="0" smtClean="0"/>
           </a:p>
         </p:txBody>
       </p:sp>
@@ -44534,7 +44588,7 @@
       </p:sp>
       <p:sp>
         <p:nvSpPr>
-          <p:cNvPr id="2" name="Rectangle 1"/>
+          <p:cNvPr id="5" name="Rectangle 4"/>
           <p:cNvSpPr/>
           <p:nvPr/>
         </p:nvSpPr>
@@ -44569,6 +44623,11 @@
         </p:txBody>
       </p:sp>
     </p:spTree>
+    <p:extLst>
+      <p:ext uri="{BB962C8B-B14F-4D97-AF65-F5344CB8AC3E}">
+        <p14:creationId xmlns:p14="http://schemas.microsoft.com/office/powerpoint/2010/main" val="2023351790"/>
+      </p:ext>
+    </p:extLst>
   </p:cSld>
   <p:clrMapOvr>
     <a:masterClrMapping/>
@@ -46242,10 +46301,6 @@
           <a:p>
             <a:pPr algn="ctr"/>
             <a:r>
-              <a:rPr lang="en-PH" sz="2000" b="1" dirty="0"/>
-              <a:t>Activity Diagram for </a:t>
-            </a:r>
-            <a:r>
               <a:rPr lang="en-PH" sz="2000" b="1" dirty="0" smtClean="0"/>
               <a:t>Entity-Relationship Diagram</a:t>
             </a:r>
@@ -46388,353 +46443,6 @@
   <p:cSld>
     <p:spTree>
       <p:nvGrpSpPr>
-        <p:cNvPr id="1" name="Shape 445"/>
-        <p:cNvGrpSpPr/>
-        <p:nvPr/>
-      </p:nvGrpSpPr>
-      <p:grpSpPr>
-        <a:xfrm>
-          <a:off x="0" y="0"/>
-          <a:ext cx="0" cy="0"/>
-          <a:chOff x="0" y="0"/>
-          <a:chExt cx="0" cy="0"/>
-        </a:xfrm>
-      </p:grpSpPr>
-      <p:sp>
-        <p:nvSpPr>
-          <p:cNvPr id="446" name="Google Shape;446;p35"/>
-          <p:cNvSpPr txBox="1">
-            <a:spLocks noGrp="1"/>
-          </p:cNvSpPr>
-          <p:nvPr>
-            <p:ph type="title"/>
-          </p:nvPr>
-        </p:nvSpPr>
-        <p:spPr>
-          <a:xfrm>
-            <a:off x="548125" y="593125"/>
-            <a:ext cx="6167100" cy="396300"/>
-          </a:xfrm>
-          <a:prstGeom prst="rect">
-            <a:avLst/>
-          </a:prstGeom>
-        </p:spPr>
-        <p:txBody>
-          <a:bodyPr spcFirstLastPara="1" wrap="square" lIns="0" tIns="0" rIns="0" bIns="0" anchor="t" anchorCtr="0">
-            <a:noAutofit/>
-          </a:bodyPr>
-          <a:lstStyle/>
-          <a:p>
-            <a:pPr marL="0" lvl="0" indent="0" algn="l" rtl="0">
-              <a:spcBef>
-                <a:spcPts val="0"/>
-              </a:spcBef>
-              <a:spcAft>
-                <a:spcPts val="0"/>
-              </a:spcAft>
-              <a:buNone/>
-            </a:pPr>
-            <a:r>
-              <a:rPr lang="en" dirty="0" smtClean="0"/>
-              <a:t>Introduction</a:t>
-            </a:r>
-            <a:endParaRPr dirty="0"/>
-          </a:p>
-        </p:txBody>
-      </p:sp>
-      <p:sp>
-        <p:nvSpPr>
-          <p:cNvPr id="447" name="Google Shape;447;p35"/>
-          <p:cNvSpPr txBox="1">
-            <a:spLocks noGrp="1"/>
-          </p:cNvSpPr>
-          <p:nvPr>
-            <p:ph type="body" idx="1"/>
-          </p:nvPr>
-        </p:nvSpPr>
-        <p:spPr>
-          <a:xfrm>
-            <a:off x="548125" y="1271600"/>
-            <a:ext cx="6167100" cy="3297900"/>
-          </a:xfrm>
-          <a:prstGeom prst="rect">
-            <a:avLst/>
-          </a:prstGeom>
-        </p:spPr>
-        <p:txBody>
-          <a:bodyPr spcFirstLastPara="1" wrap="square" lIns="0" tIns="0" rIns="0" bIns="0" anchor="t" anchorCtr="0">
-            <a:noAutofit/>
-          </a:bodyPr>
-          <a:lstStyle/>
-          <a:p>
-            <a:pPr lvl="0" indent="-381000">
-              <a:spcBef>
-                <a:spcPts val="800"/>
-              </a:spcBef>
-              <a:buClr>
-                <a:schemeClr val="accent4"/>
-              </a:buClr>
-              <a:buSzPts val="2400"/>
-            </a:pPr>
-            <a:r>
-              <a:rPr lang="en-PH" dirty="0" smtClean="0">
-                <a:solidFill>
-                  <a:schemeClr val="tx1"/>
-                </a:solidFill>
-              </a:rPr>
-              <a:t>Computer-Aided Instruction is one of innovation in the modern technology.</a:t>
-            </a:r>
-          </a:p>
-          <a:p>
-            <a:pPr lvl="0" indent="-381000">
-              <a:spcBef>
-                <a:spcPts val="800"/>
-              </a:spcBef>
-              <a:buClr>
-                <a:schemeClr val="accent4"/>
-              </a:buClr>
-              <a:buSzPts val="2400"/>
-            </a:pPr>
-            <a:r>
-              <a:rPr lang="en-PH" dirty="0" smtClean="0">
-                <a:solidFill>
-                  <a:schemeClr val="tx1"/>
-                </a:solidFill>
-              </a:rPr>
-              <a:t>Transitioning of traditional education to blended type of learning .</a:t>
-            </a:r>
-          </a:p>
-          <a:p>
-            <a:pPr lvl="0" indent="-381000">
-              <a:spcBef>
-                <a:spcPts val="800"/>
-              </a:spcBef>
-              <a:buClr>
-                <a:schemeClr val="accent4"/>
-              </a:buClr>
-              <a:buSzPts val="2400"/>
-            </a:pPr>
-            <a:r>
-              <a:rPr lang="en-PH" dirty="0" smtClean="0">
-                <a:solidFill>
-                  <a:schemeClr val="tx1"/>
-                </a:solidFill>
-              </a:rPr>
-              <a:t>The current pandemic has become a major hindrance to education and society as a whole.</a:t>
-            </a:r>
-          </a:p>
-          <a:p>
-            <a:pPr lvl="0" indent="-381000">
-              <a:spcBef>
-                <a:spcPts val="800"/>
-              </a:spcBef>
-              <a:buClr>
-                <a:schemeClr val="accent4"/>
-              </a:buClr>
-              <a:buSzPts val="2400"/>
-            </a:pPr>
-            <a:endParaRPr lang="en-PH" dirty="0" smtClean="0"/>
-          </a:p>
-          <a:p>
-            <a:pPr lvl="0" indent="-381000">
-              <a:spcBef>
-                <a:spcPts val="800"/>
-              </a:spcBef>
-              <a:buClr>
-                <a:schemeClr val="accent4"/>
-              </a:buClr>
-              <a:buSzPts val="2400"/>
-            </a:pPr>
-            <a:endParaRPr lang="en-PH" dirty="0" smtClean="0"/>
-          </a:p>
-        </p:txBody>
-      </p:sp>
-      <p:sp>
-        <p:nvSpPr>
-          <p:cNvPr id="448" name="Google Shape;448;p35"/>
-          <p:cNvSpPr txBox="1">
-            <a:spLocks noGrp="1"/>
-          </p:cNvSpPr>
-          <p:nvPr>
-            <p:ph type="sldNum" idx="12"/>
-          </p:nvPr>
-        </p:nvSpPr>
-        <p:spPr>
-          <a:xfrm>
-            <a:off x="8404384" y="199526"/>
-            <a:ext cx="548700" cy="393600"/>
-          </a:xfrm>
-          <a:prstGeom prst="rect">
-            <a:avLst/>
-          </a:prstGeom>
-        </p:spPr>
-        <p:txBody>
-          <a:bodyPr spcFirstLastPara="1" wrap="square" lIns="0" tIns="0" rIns="0" bIns="0" anchor="t" anchorCtr="0">
-            <a:noAutofit/>
-          </a:bodyPr>
-          <a:lstStyle/>
-          <a:p>
-            <a:pPr marL="0" lvl="0" indent="0" algn="r" rtl="0">
-              <a:spcBef>
-                <a:spcPts val="0"/>
-              </a:spcBef>
-              <a:spcAft>
-                <a:spcPts val="0"/>
-              </a:spcAft>
-              <a:buNone/>
-            </a:pPr>
-            <a:fld id="{00000000-1234-1234-1234-123412341234}" type="slidenum">
-              <a:rPr lang="en"/>
-              <a:t>4</a:t>
-            </a:fld>
-            <a:endParaRPr/>
-          </a:p>
-        </p:txBody>
-      </p:sp>
-      <p:sp>
-        <p:nvSpPr>
-          <p:cNvPr id="5" name="Rectangle 4"/>
-          <p:cNvSpPr/>
-          <p:nvPr/>
-        </p:nvSpPr>
-        <p:spPr>
-          <a:xfrm>
-            <a:off x="460862" y="285177"/>
-            <a:ext cx="1336407" cy="307777"/>
-          </a:xfrm>
-          <a:prstGeom prst="rect">
-            <a:avLst/>
-          </a:prstGeom>
-        </p:spPr>
-        <p:txBody>
-          <a:bodyPr wrap="square">
-            <a:spAutoFit/>
-          </a:bodyPr>
-          <a:lstStyle/>
-          <a:p>
-            <a:r>
-              <a:rPr lang="en" dirty="0">
-                <a:solidFill>
-                  <a:schemeClr val="accent6"/>
-                </a:solidFill>
-                <a:latin typeface="Walter Turncoat" panose="02000000000000000000" charset="0"/>
-              </a:rPr>
-              <a:t>Chapter 1</a:t>
-            </a:r>
-            <a:endParaRPr lang="en-US" dirty="0">
-              <a:latin typeface="Walter Turncoat" panose="02000000000000000000" charset="0"/>
-            </a:endParaRPr>
-          </a:p>
-        </p:txBody>
-      </p:sp>
-    </p:spTree>
-    <p:extLst>
-      <p:ext uri="{BB962C8B-B14F-4D97-AF65-F5344CB8AC3E}">
-        <p14:creationId xmlns:p14="http://schemas.microsoft.com/office/powerpoint/2010/main" val="2023351790"/>
-      </p:ext>
-    </p:extLst>
-  </p:cSld>
-  <p:clrMapOvr>
-    <a:masterClrMapping/>
-  </p:clrMapOvr>
-  <p:timing>
-    <p:tnLst>
-      <p:par>
-        <p:cTn id="1" dur="indefinite" restart="never" nodeType="tmRoot"/>
-      </p:par>
-    </p:tnLst>
-  </p:timing>
-</p:sld>
-</file>
-
-<file path=ppt/slides/slide40.xml><?xml version="1.0" encoding="utf-8"?>
-<p:sld xmlns:a="http://schemas.openxmlformats.org/drawingml/2006/main" xmlns:r="http://schemas.openxmlformats.org/officeDocument/2006/relationships" xmlns:p="http://schemas.openxmlformats.org/presentationml/2006/main">
-  <p:cSld>
-    <p:spTree>
-      <p:nvGrpSpPr>
-        <p:cNvPr id="1" name="Shape 221"/>
-        <p:cNvGrpSpPr/>
-        <p:nvPr/>
-      </p:nvGrpSpPr>
-      <p:grpSpPr>
-        <a:xfrm>
-          <a:off x="0" y="0"/>
-          <a:ext cx="0" cy="0"/>
-          <a:chOff x="0" y="0"/>
-          <a:chExt cx="0" cy="0"/>
-        </a:xfrm>
-      </p:grpSpPr>
-      <p:sp>
-        <p:nvSpPr>
-          <p:cNvPr id="222" name="Google Shape;222;p13"/>
-          <p:cNvSpPr txBox="1">
-            <a:spLocks noGrp="1"/>
-          </p:cNvSpPr>
-          <p:nvPr>
-            <p:ph type="ctrTitle"/>
-          </p:nvPr>
-        </p:nvSpPr>
-        <p:spPr>
-          <a:xfrm>
-            <a:off x="2323325" y="793100"/>
-            <a:ext cx="4497300" cy="3557400"/>
-          </a:xfrm>
-          <a:prstGeom prst="rect">
-            <a:avLst/>
-          </a:prstGeom>
-        </p:spPr>
-        <p:txBody>
-          <a:bodyPr spcFirstLastPara="1" wrap="square" lIns="0" tIns="0" rIns="0" bIns="0" anchor="ctr" anchorCtr="0">
-            <a:noAutofit/>
-          </a:bodyPr>
-          <a:lstStyle/>
-          <a:p>
-            <a:pPr marL="0" lvl="0" indent="0" algn="ctr" rtl="0">
-              <a:spcBef>
-                <a:spcPts val="0"/>
-              </a:spcBef>
-              <a:spcAft>
-                <a:spcPts val="0"/>
-              </a:spcAft>
-              <a:buNone/>
-            </a:pPr>
-            <a:r>
-              <a:rPr lang="en" sz="3200" dirty="0" smtClean="0"/>
-              <a:t>THANK YOU</a:t>
-            </a:r>
-            <a:r>
-              <a:rPr lang="en" sz="3200" dirty="0" smtClean="0"/>
-              <a:t>!</a:t>
-            </a:r>
-            <a:endParaRPr sz="3200" dirty="0"/>
-          </a:p>
-        </p:txBody>
-      </p:sp>
-    </p:spTree>
-    <p:extLst>
-      <p:ext uri="{BB962C8B-B14F-4D97-AF65-F5344CB8AC3E}">
-        <p14:creationId xmlns:p14="http://schemas.microsoft.com/office/powerpoint/2010/main" val="351685301"/>
-      </p:ext>
-    </p:extLst>
-  </p:cSld>
-  <p:clrMapOvr>
-    <a:masterClrMapping/>
-  </p:clrMapOvr>
-  <p:timing>
-    <p:tnLst>
-      <p:par>
-        <p:cTn id="1" dur="indefinite" restart="never" nodeType="tmRoot"/>
-      </p:par>
-    </p:tnLst>
-  </p:timing>
-</p:sld>
-</file>
-
-<file path=ppt/slides/slide5.xml><?xml version="1.0" encoding="utf-8"?>
-<p:sld xmlns:a="http://schemas.openxmlformats.org/drawingml/2006/main" xmlns:r="http://schemas.openxmlformats.org/officeDocument/2006/relationships" xmlns:p="http://schemas.openxmlformats.org/presentationml/2006/main">
-  <p:cSld>
-    <p:spTree>
-      <p:nvGrpSpPr>
         <p:cNvPr id="1" name="Shape 280"/>
         <p:cNvGrpSpPr/>
         <p:nvPr/>
@@ -46783,7 +46491,7 @@
             </a:pPr>
             <a:fld id="{00000000-1234-1234-1234-123412341234}" type="slidenum">
               <a:rPr lang="en"/>
-              <a:t>5</a:t>
+              <a:t>4</a:t>
             </a:fld>
             <a:endParaRPr/>
           </a:p>
@@ -46858,16 +46566,12 @@
           <a:p>
             <a:pPr lvl="0" fontAlgn="auto"/>
             <a:r>
-              <a:rPr lang="en-PH" dirty="0" smtClean="0"/>
-              <a:t>1. </a:t>
-            </a:r>
-            <a:r>
               <a:rPr lang="en-PH" dirty="0" smtClean="0">
                 <a:solidFill>
                   <a:schemeClr val="tx1"/>
                 </a:solidFill>
               </a:rPr>
-              <a:t>What </a:t>
+              <a:t>1. What </a:t>
             </a:r>
             <a:r>
               <a:rPr lang="en-PH" dirty="0">
@@ -46989,7 +46693,86 @@
 </p:sld>
 </file>
 
-<file path=ppt/slides/slide6.xml><?xml version="1.0" encoding="utf-8"?>
+<file path=ppt/slides/slide40.xml><?xml version="1.0" encoding="utf-8"?>
+<p:sld xmlns:a="http://schemas.openxmlformats.org/drawingml/2006/main" xmlns:r="http://schemas.openxmlformats.org/officeDocument/2006/relationships" xmlns:p="http://schemas.openxmlformats.org/presentationml/2006/main">
+  <p:cSld>
+    <p:spTree>
+      <p:nvGrpSpPr>
+        <p:cNvPr id="1" name="Shape 221"/>
+        <p:cNvGrpSpPr/>
+        <p:nvPr/>
+      </p:nvGrpSpPr>
+      <p:grpSpPr>
+        <a:xfrm>
+          <a:off x="0" y="0"/>
+          <a:ext cx="0" cy="0"/>
+          <a:chOff x="0" y="0"/>
+          <a:chExt cx="0" cy="0"/>
+        </a:xfrm>
+      </p:grpSpPr>
+      <p:sp>
+        <p:nvSpPr>
+          <p:cNvPr id="222" name="Google Shape;222;p13"/>
+          <p:cNvSpPr txBox="1">
+            <a:spLocks noGrp="1"/>
+          </p:cNvSpPr>
+          <p:nvPr>
+            <p:ph type="ctrTitle"/>
+          </p:nvPr>
+        </p:nvSpPr>
+        <p:spPr>
+          <a:xfrm>
+            <a:off x="2323325" y="793100"/>
+            <a:ext cx="4497300" cy="3557400"/>
+          </a:xfrm>
+          <a:prstGeom prst="rect">
+            <a:avLst/>
+          </a:prstGeom>
+        </p:spPr>
+        <p:txBody>
+          <a:bodyPr spcFirstLastPara="1" wrap="square" lIns="0" tIns="0" rIns="0" bIns="0" anchor="ctr" anchorCtr="0">
+            <a:noAutofit/>
+          </a:bodyPr>
+          <a:lstStyle/>
+          <a:p>
+            <a:pPr marL="0" lvl="0" indent="0" algn="ctr" rtl="0">
+              <a:spcBef>
+                <a:spcPts val="0"/>
+              </a:spcBef>
+              <a:spcAft>
+                <a:spcPts val="0"/>
+              </a:spcAft>
+              <a:buNone/>
+            </a:pPr>
+            <a:r>
+              <a:rPr lang="en" sz="3200" dirty="0" smtClean="0"/>
+              <a:t>THANK YOU!</a:t>
+            </a:r>
+            <a:endParaRPr sz="3200" dirty="0"/>
+          </a:p>
+        </p:txBody>
+      </p:sp>
+    </p:spTree>
+    <p:extLst>
+      <p:ext uri="{BB962C8B-B14F-4D97-AF65-F5344CB8AC3E}">
+        <p14:creationId xmlns:p14="http://schemas.microsoft.com/office/powerpoint/2010/main" val="351685301"/>
+      </p:ext>
+    </p:extLst>
+  </p:cSld>
+  <p:clrMapOvr>
+    <a:masterClrMapping/>
+  </p:clrMapOvr>
+  <p:timing>
+    <p:tnLst>
+      <p:par>
+        <p:cTn id="1" dur="indefinite" restart="never" nodeType="tmRoot"/>
+      </p:par>
+    </p:tnLst>
+  </p:timing>
+</p:sld>
+</file>
+
+<file path=ppt/slides/slide5.xml><?xml version="1.0" encoding="utf-8"?>
 <p:sld xmlns:a="http://schemas.openxmlformats.org/drawingml/2006/main" xmlns:r="http://schemas.openxmlformats.org/officeDocument/2006/relationships" xmlns:p="http://schemas.openxmlformats.org/presentationml/2006/main">
   <p:cSld>
     <p:spTree>
@@ -47042,7 +46825,7 @@
             </a:pPr>
             <a:fld id="{00000000-1234-1234-1234-123412341234}" type="slidenum">
               <a:rPr lang="en"/>
-              <a:t>6</a:t>
+              <a:t>5</a:t>
             </a:fld>
             <a:endParaRPr/>
           </a:p>
@@ -47299,7 +47082,7 @@
 </p:sld>
 </file>
 
-<file path=ppt/slides/slide7.xml><?xml version="1.0" encoding="utf-8"?>
+<file path=ppt/slides/slide6.xml><?xml version="1.0" encoding="utf-8"?>
 <p:sld xmlns:a="http://schemas.openxmlformats.org/drawingml/2006/main" xmlns:r="http://schemas.openxmlformats.org/officeDocument/2006/relationships" xmlns:p="http://schemas.openxmlformats.org/presentationml/2006/main">
   <p:cSld>
     <p:spTree>
@@ -47352,7 +47135,7 @@
             </a:pPr>
             <a:fld id="{00000000-1234-1234-1234-123412341234}" type="slidenum">
               <a:rPr lang="en"/>
-              <a:t>7</a:t>
+              <a:t>6</a:t>
             </a:fld>
             <a:endParaRPr/>
           </a:p>
@@ -47574,7 +47357,7 @@
 </p:sld>
 </file>
 
-<file path=ppt/slides/slide8.xml><?xml version="1.0" encoding="utf-8"?>
+<file path=ppt/slides/slide7.xml><?xml version="1.0" encoding="utf-8"?>
 <p:sld xmlns:a="http://schemas.openxmlformats.org/drawingml/2006/main" xmlns:r="http://schemas.openxmlformats.org/officeDocument/2006/relationships" xmlns:p="http://schemas.openxmlformats.org/presentationml/2006/main">
   <p:cSld>
     <p:spTree>
@@ -47627,7 +47410,7 @@
             </a:pPr>
             <a:fld id="{00000000-1234-1234-1234-123412341234}" type="slidenum">
               <a:rPr lang="en"/>
-              <a:t>8</a:t>
+              <a:t>7</a:t>
             </a:fld>
             <a:endParaRPr/>
           </a:p>
@@ -48649,7 +48432,7 @@
 </p:sld>
 </file>
 
-<file path=ppt/slides/slide9.xml><?xml version="1.0" encoding="utf-8"?>
+<file path=ppt/slides/slide8.xml><?xml version="1.0" encoding="utf-8"?>
 <p:sld xmlns:a="http://schemas.openxmlformats.org/drawingml/2006/main" xmlns:r="http://schemas.openxmlformats.org/officeDocument/2006/relationships" xmlns:p="http://schemas.openxmlformats.org/presentationml/2006/main">
   <p:cSld>
     <p:spTree>
@@ -48715,7 +48498,7 @@
             </a:pPr>
             <a:fld id="{00000000-1234-1234-1234-123412341234}" type="slidenum">
               <a:rPr lang="en" smtClean="0"/>
-              <a:t>9</a:t>
+              <a:t>8</a:t>
             </a:fld>
             <a:endParaRPr lang="en"/>
           </a:p>
@@ -48797,6 +48580,471 @@
     <p:extLst>
       <p:ext uri="{BB962C8B-B14F-4D97-AF65-F5344CB8AC3E}">
         <p14:creationId xmlns:p14="http://schemas.microsoft.com/office/powerpoint/2010/main" val="1824741386"/>
+      </p:ext>
+    </p:extLst>
+  </p:cSld>
+  <p:clrMapOvr>
+    <a:masterClrMapping/>
+  </p:clrMapOvr>
+  <p:timing>
+    <p:tnLst>
+      <p:par>
+        <p:cTn id="1" dur="indefinite" restart="never" nodeType="tmRoot"/>
+      </p:par>
+    </p:tnLst>
+  </p:timing>
+</p:sld>
+</file>
+
+<file path=ppt/slides/slide9.xml><?xml version="1.0" encoding="utf-8"?>
+<p:sld xmlns:a="http://schemas.openxmlformats.org/drawingml/2006/main" xmlns:r="http://schemas.openxmlformats.org/officeDocument/2006/relationships" xmlns:p="http://schemas.openxmlformats.org/presentationml/2006/main">
+  <p:cSld>
+    <p:spTree>
+      <p:nvGrpSpPr>
+        <p:cNvPr id="1" name="Shape 374"/>
+        <p:cNvGrpSpPr/>
+        <p:nvPr/>
+      </p:nvGrpSpPr>
+      <p:grpSpPr>
+        <a:xfrm>
+          <a:off x="0" y="0"/>
+          <a:ext cx="0" cy="0"/>
+          <a:chOff x="0" y="0"/>
+          <a:chExt cx="0" cy="0"/>
+        </a:xfrm>
+      </p:grpSpPr>
+      <p:sp>
+        <p:nvSpPr>
+          <p:cNvPr id="376" name="Google Shape;376;p30"/>
+          <p:cNvSpPr txBox="1">
+            <a:spLocks noGrp="1"/>
+          </p:cNvSpPr>
+          <p:nvPr>
+            <p:ph type="sldNum" idx="12"/>
+          </p:nvPr>
+        </p:nvSpPr>
+        <p:spPr>
+          <a:xfrm>
+            <a:off x="8404384" y="199526"/>
+            <a:ext cx="548700" cy="393600"/>
+          </a:xfrm>
+          <a:prstGeom prst="rect">
+            <a:avLst/>
+          </a:prstGeom>
+        </p:spPr>
+        <p:txBody>
+          <a:bodyPr spcFirstLastPara="1" wrap="square" lIns="0" tIns="0" rIns="0" bIns="0" anchor="t" anchorCtr="0">
+            <a:noAutofit/>
+          </a:bodyPr>
+          <a:lstStyle/>
+          <a:p>
+            <a:pPr marL="0" lvl="0" indent="0" algn="r" rtl="0">
+              <a:spcBef>
+                <a:spcPts val="0"/>
+              </a:spcBef>
+              <a:spcAft>
+                <a:spcPts val="0"/>
+              </a:spcAft>
+              <a:buNone/>
+            </a:pPr>
+            <a:fld id="{00000000-1234-1234-1234-123412341234}" type="slidenum">
+              <a:rPr lang="en"/>
+              <a:t>9</a:t>
+            </a:fld>
+            <a:endParaRPr/>
+          </a:p>
+        </p:txBody>
+      </p:sp>
+      <p:sp>
+        <p:nvSpPr>
+          <p:cNvPr id="7" name="Google Shape;447;p35"/>
+          <p:cNvSpPr txBox="1">
+            <a:spLocks noGrp="1"/>
+          </p:cNvSpPr>
+          <p:nvPr>
+            <p:ph type="body" idx="1"/>
+          </p:nvPr>
+        </p:nvSpPr>
+        <p:spPr>
+          <a:xfrm>
+            <a:off x="289412" y="1290650"/>
+            <a:ext cx="6167100" cy="3297900"/>
+          </a:xfrm>
+          <a:prstGeom prst="rect">
+            <a:avLst/>
+          </a:prstGeom>
+        </p:spPr>
+        <p:txBody>
+          <a:bodyPr spcFirstLastPara="1" wrap="square" lIns="0" tIns="0" rIns="0" bIns="0" anchor="t" anchorCtr="0">
+            <a:noAutofit/>
+          </a:bodyPr>
+          <a:lstStyle/>
+          <a:p>
+            <a:pPr algn="just" fontAlgn="auto"/>
+            <a:r>
+              <a:rPr lang="en-PH" dirty="0" smtClean="0"/>
+              <a:t>		</a:t>
+            </a:r>
+          </a:p>
+          <a:p>
+            <a:pPr algn="just" fontAlgn="auto"/>
+            <a:r>
+              <a:rPr lang="en-PH" dirty="0"/>
+              <a:t>	</a:t>
+            </a:r>
+            <a:r>
+              <a:rPr lang="en-PH" dirty="0" smtClean="0"/>
+              <a:t>	</a:t>
+            </a:r>
+            <a:r>
+              <a:rPr lang="en-PH" dirty="0" smtClean="0">
+                <a:solidFill>
+                  <a:schemeClr val="tx1"/>
+                </a:solidFill>
+              </a:rPr>
+              <a:t>The </a:t>
+            </a:r>
+            <a:r>
+              <a:rPr lang="en-PH" dirty="0">
+                <a:solidFill>
+                  <a:schemeClr val="tx1"/>
+                </a:solidFill>
+              </a:rPr>
+              <a:t>study to be conducted by the researchers pose </a:t>
+            </a:r>
+            <a:r>
+              <a:rPr lang="en-PH" dirty="0" smtClean="0">
+                <a:solidFill>
+                  <a:schemeClr val="tx1"/>
+                </a:solidFill>
+              </a:rPr>
+              <a:t>great significance </a:t>
+            </a:r>
+            <a:r>
+              <a:rPr lang="en-PH" dirty="0">
+                <a:solidFill>
+                  <a:schemeClr val="tx1"/>
+                </a:solidFill>
+              </a:rPr>
+              <a:t>to the transitions needed on improving the ways in which education is presented to the students. With the premise of introducing a platform in which a student can learn from an intuitive system designed for preschool to kinder learning.</a:t>
+            </a:r>
+            <a:endParaRPr lang="en-US" sz="1600" dirty="0">
+              <a:solidFill>
+                <a:schemeClr val="tx1"/>
+              </a:solidFill>
+            </a:endParaRPr>
+          </a:p>
+        </p:txBody>
+      </p:sp>
+      <p:sp>
+        <p:nvSpPr>
+          <p:cNvPr id="8" name="Rectangle 7"/>
+          <p:cNvSpPr/>
+          <p:nvPr/>
+        </p:nvSpPr>
+        <p:spPr>
+          <a:xfrm>
+            <a:off x="460862" y="285177"/>
+            <a:ext cx="1336407" cy="307777"/>
+          </a:xfrm>
+          <a:prstGeom prst="rect">
+            <a:avLst/>
+          </a:prstGeom>
+        </p:spPr>
+        <p:txBody>
+          <a:bodyPr wrap="square">
+            <a:spAutoFit/>
+          </a:bodyPr>
+          <a:lstStyle/>
+          <a:p>
+            <a:r>
+              <a:rPr lang="en" dirty="0">
+                <a:solidFill>
+                  <a:schemeClr val="accent6"/>
+                </a:solidFill>
+                <a:latin typeface="Walter Turncoat" panose="02000000000000000000" charset="0"/>
+              </a:rPr>
+              <a:t>Chapter 1</a:t>
+            </a:r>
+            <a:endParaRPr lang="en-US" dirty="0">
+              <a:latin typeface="Walter Turncoat" panose="02000000000000000000" charset="0"/>
+            </a:endParaRPr>
+          </a:p>
+        </p:txBody>
+      </p:sp>
+      <p:sp>
+        <p:nvSpPr>
+          <p:cNvPr id="9" name="Google Shape;446;p35"/>
+          <p:cNvSpPr txBox="1">
+            <a:spLocks/>
+          </p:cNvSpPr>
+          <p:nvPr/>
+        </p:nvSpPr>
+        <p:spPr>
+          <a:xfrm>
+            <a:off x="548125" y="593125"/>
+            <a:ext cx="6167100" cy="396300"/>
+          </a:xfrm>
+          <a:prstGeom prst="rect">
+            <a:avLst/>
+          </a:prstGeom>
+        </p:spPr>
+        <p:txBody>
+          <a:bodyPr spcFirstLastPara="1" wrap="square" lIns="0" tIns="0" rIns="0" bIns="0" anchor="t" anchorCtr="0">
+            <a:noAutofit/>
+          </a:bodyPr>
+          <a:lstStyle>
+            <a:defPPr marR="0" lvl="0" algn="l" rtl="0">
+              <a:lnSpc>
+                <a:spcPct val="100000"/>
+              </a:lnSpc>
+              <a:spcBef>
+                <a:spcPts val="0"/>
+              </a:spcBef>
+              <a:spcAft>
+                <a:spcPts val="0"/>
+              </a:spcAft>
+            </a:defPPr>
+            <a:lvl1pPr marR="0" lvl="0" algn="l" rtl="0">
+              <a:lnSpc>
+                <a:spcPct val="100000"/>
+              </a:lnSpc>
+              <a:spcBef>
+                <a:spcPts val="0"/>
+              </a:spcBef>
+              <a:spcAft>
+                <a:spcPts val="0"/>
+              </a:spcAft>
+              <a:buClr>
+                <a:srgbClr val="000000"/>
+              </a:buClr>
+              <a:buFont typeface="Arial"/>
+              <a:defRPr sz="1400" b="0" i="0" u="none" strike="noStrike" cap="none">
+                <a:solidFill>
+                  <a:srgbClr val="000000"/>
+                </a:solidFill>
+                <a:latin typeface="Arial"/>
+                <a:ea typeface="Arial"/>
+                <a:cs typeface="Arial"/>
+                <a:sym typeface="Arial"/>
+              </a:defRPr>
+            </a:lvl1pPr>
+            <a:lvl2pPr marR="0" lvl="1" algn="l" rtl="0">
+              <a:lnSpc>
+                <a:spcPct val="100000"/>
+              </a:lnSpc>
+              <a:spcBef>
+                <a:spcPts val="0"/>
+              </a:spcBef>
+              <a:spcAft>
+                <a:spcPts val="0"/>
+              </a:spcAft>
+              <a:buClr>
+                <a:srgbClr val="000000"/>
+              </a:buClr>
+              <a:buFont typeface="Arial"/>
+              <a:defRPr sz="1400" b="0" i="0" u="none" strike="noStrike" cap="none">
+                <a:solidFill>
+                  <a:srgbClr val="000000"/>
+                </a:solidFill>
+                <a:latin typeface="Arial"/>
+                <a:ea typeface="Arial"/>
+                <a:cs typeface="Arial"/>
+                <a:sym typeface="Arial"/>
+              </a:defRPr>
+            </a:lvl2pPr>
+            <a:lvl3pPr marR="0" lvl="2" algn="l" rtl="0">
+              <a:lnSpc>
+                <a:spcPct val="100000"/>
+              </a:lnSpc>
+              <a:spcBef>
+                <a:spcPts val="0"/>
+              </a:spcBef>
+              <a:spcAft>
+                <a:spcPts val="0"/>
+              </a:spcAft>
+              <a:buClr>
+                <a:srgbClr val="000000"/>
+              </a:buClr>
+              <a:buFont typeface="Arial"/>
+              <a:defRPr sz="1400" b="0" i="0" u="none" strike="noStrike" cap="none">
+                <a:solidFill>
+                  <a:srgbClr val="000000"/>
+                </a:solidFill>
+                <a:latin typeface="Arial"/>
+                <a:ea typeface="Arial"/>
+                <a:cs typeface="Arial"/>
+                <a:sym typeface="Arial"/>
+              </a:defRPr>
+            </a:lvl3pPr>
+            <a:lvl4pPr marR="0" lvl="3" algn="l" rtl="0">
+              <a:lnSpc>
+                <a:spcPct val="100000"/>
+              </a:lnSpc>
+              <a:spcBef>
+                <a:spcPts val="0"/>
+              </a:spcBef>
+              <a:spcAft>
+                <a:spcPts val="0"/>
+              </a:spcAft>
+              <a:buClr>
+                <a:srgbClr val="000000"/>
+              </a:buClr>
+              <a:buFont typeface="Arial"/>
+              <a:defRPr sz="1400" b="0" i="0" u="none" strike="noStrike" cap="none">
+                <a:solidFill>
+                  <a:srgbClr val="000000"/>
+                </a:solidFill>
+                <a:latin typeface="Arial"/>
+                <a:ea typeface="Arial"/>
+                <a:cs typeface="Arial"/>
+                <a:sym typeface="Arial"/>
+              </a:defRPr>
+            </a:lvl4pPr>
+            <a:lvl5pPr marR="0" lvl="4" algn="l" rtl="0">
+              <a:lnSpc>
+                <a:spcPct val="100000"/>
+              </a:lnSpc>
+              <a:spcBef>
+                <a:spcPts val="0"/>
+              </a:spcBef>
+              <a:spcAft>
+                <a:spcPts val="0"/>
+              </a:spcAft>
+              <a:buClr>
+                <a:srgbClr val="000000"/>
+              </a:buClr>
+              <a:buFont typeface="Arial"/>
+              <a:defRPr sz="1400" b="0" i="0" u="none" strike="noStrike" cap="none">
+                <a:solidFill>
+                  <a:srgbClr val="000000"/>
+                </a:solidFill>
+                <a:latin typeface="Arial"/>
+                <a:ea typeface="Arial"/>
+                <a:cs typeface="Arial"/>
+                <a:sym typeface="Arial"/>
+              </a:defRPr>
+            </a:lvl5pPr>
+            <a:lvl6pPr marR="0" lvl="5" algn="l" rtl="0">
+              <a:lnSpc>
+                <a:spcPct val="100000"/>
+              </a:lnSpc>
+              <a:spcBef>
+                <a:spcPts val="0"/>
+              </a:spcBef>
+              <a:spcAft>
+                <a:spcPts val="0"/>
+              </a:spcAft>
+              <a:buClr>
+                <a:srgbClr val="000000"/>
+              </a:buClr>
+              <a:buFont typeface="Arial"/>
+              <a:defRPr sz="1400" b="0" i="0" u="none" strike="noStrike" cap="none">
+                <a:solidFill>
+                  <a:srgbClr val="000000"/>
+                </a:solidFill>
+                <a:latin typeface="Arial"/>
+                <a:ea typeface="Arial"/>
+                <a:cs typeface="Arial"/>
+                <a:sym typeface="Arial"/>
+              </a:defRPr>
+            </a:lvl6pPr>
+            <a:lvl7pPr marR="0" lvl="6" algn="l" rtl="0">
+              <a:lnSpc>
+                <a:spcPct val="100000"/>
+              </a:lnSpc>
+              <a:spcBef>
+                <a:spcPts val="0"/>
+              </a:spcBef>
+              <a:spcAft>
+                <a:spcPts val="0"/>
+              </a:spcAft>
+              <a:buClr>
+                <a:srgbClr val="000000"/>
+              </a:buClr>
+              <a:buFont typeface="Arial"/>
+              <a:defRPr sz="1400" b="0" i="0" u="none" strike="noStrike" cap="none">
+                <a:solidFill>
+                  <a:srgbClr val="000000"/>
+                </a:solidFill>
+                <a:latin typeface="Arial"/>
+                <a:ea typeface="Arial"/>
+                <a:cs typeface="Arial"/>
+                <a:sym typeface="Arial"/>
+              </a:defRPr>
+            </a:lvl7pPr>
+            <a:lvl8pPr marR="0" lvl="7" algn="l" rtl="0">
+              <a:lnSpc>
+                <a:spcPct val="100000"/>
+              </a:lnSpc>
+              <a:spcBef>
+                <a:spcPts val="0"/>
+              </a:spcBef>
+              <a:spcAft>
+                <a:spcPts val="0"/>
+              </a:spcAft>
+              <a:buClr>
+                <a:srgbClr val="000000"/>
+              </a:buClr>
+              <a:buFont typeface="Arial"/>
+              <a:defRPr sz="1400" b="0" i="0" u="none" strike="noStrike" cap="none">
+                <a:solidFill>
+                  <a:srgbClr val="000000"/>
+                </a:solidFill>
+                <a:latin typeface="Arial"/>
+                <a:ea typeface="Arial"/>
+                <a:cs typeface="Arial"/>
+                <a:sym typeface="Arial"/>
+              </a:defRPr>
+            </a:lvl8pPr>
+            <a:lvl9pPr marR="0" lvl="8" algn="l" rtl="0">
+              <a:lnSpc>
+                <a:spcPct val="100000"/>
+              </a:lnSpc>
+              <a:spcBef>
+                <a:spcPts val="0"/>
+              </a:spcBef>
+              <a:spcAft>
+                <a:spcPts val="0"/>
+              </a:spcAft>
+              <a:buClr>
+                <a:srgbClr val="000000"/>
+              </a:buClr>
+              <a:buFont typeface="Arial"/>
+              <a:defRPr sz="1400" b="0" i="0" u="none" strike="noStrike" cap="none">
+                <a:solidFill>
+                  <a:srgbClr val="000000"/>
+                </a:solidFill>
+                <a:latin typeface="Arial"/>
+                <a:ea typeface="Arial"/>
+                <a:cs typeface="Arial"/>
+                <a:sym typeface="Arial"/>
+              </a:defRPr>
+            </a:lvl9pPr>
+          </a:lstStyle>
+          <a:p>
+            <a:r>
+              <a:rPr lang="en-US" sz="3000" dirty="0" smtClean="0">
+                <a:solidFill>
+                  <a:schemeClr val="tx1"/>
+                </a:solidFill>
+                <a:latin typeface="Walter Turncoat" panose="02000000000000000000" charset="0"/>
+              </a:rPr>
+              <a:t>Significance of the study</a:t>
+            </a:r>
+            <a:endParaRPr lang="en-US" sz="3000" dirty="0">
+              <a:solidFill>
+                <a:schemeClr val="tx1"/>
+              </a:solidFill>
+              <a:latin typeface="Walter Turncoat" panose="02000000000000000000" charset="0"/>
+            </a:endParaRPr>
+          </a:p>
+        </p:txBody>
+      </p:sp>
+    </p:spTree>
+    <p:extLst>
+      <p:ext uri="{BB962C8B-B14F-4D97-AF65-F5344CB8AC3E}">
+        <p14:creationId xmlns:p14="http://schemas.microsoft.com/office/powerpoint/2010/main" val="640416534"/>
       </p:ext>
     </p:extLst>
   </p:cSld>

</xml_diff>